<commit_message>
Update, llegue hasta el segundo experimento
</commit_message>
<xml_diff>
--- a/Defensa/Defensa.pptx
+++ b/Defensa/Defensa.pptx
@@ -5,10 +5,10 @@
     <p:sldMasterId id="2147483648" r:id="rId1"/>
   </p:sldMasterIdLst>
   <p:notesMasterIdLst>
-    <p:notesMasterId r:id="rId14"/>
+    <p:notesMasterId r:id="rId17"/>
   </p:notesMasterIdLst>
   <p:handoutMasterIdLst>
-    <p:handoutMasterId r:id="rId15"/>
+    <p:handoutMasterId r:id="rId18"/>
   </p:handoutMasterIdLst>
   <p:sldIdLst>
     <p:sldId id="256" r:id="rId2"/>
@@ -23,6 +23,9 @@
     <p:sldId id="268" r:id="rId11"/>
     <p:sldId id="263" r:id="rId12"/>
     <p:sldId id="267" r:id="rId13"/>
+    <p:sldId id="269" r:id="rId14"/>
+    <p:sldId id="270" r:id="rId15"/>
+    <p:sldId id="271" r:id="rId16"/>
   </p:sldIdLst>
   <p:sldSz cx="9144000" cy="6858000" type="screen4x3"/>
   <p:notesSz cx="6858000" cy="9144000"/>
@@ -210,7 +213,7 @@
           <a:p>
             <a:fld id="{F69F84D8-BC80-48B6-95A7-60E47B347B22}" type="datetimeFigureOut">
               <a:rPr lang="es-ES" smtClean="0"/>
-              <a:t>12/12/2016</a:t>
+              <a:t>13/12/2016</a:t>
             </a:fld>
             <a:endParaRPr lang="es-ES"/>
           </a:p>
@@ -380,7 +383,7 @@
           <a:p>
             <a:fld id="{7AF7D300-F8B8-4A3E-9E51-3DBF14BFE534}" type="datetimeFigureOut">
               <a:rPr lang="es-ES" smtClean="0"/>
-              <a:t>12/12/2016</a:t>
+              <a:t>13/12/2016</a:t>
             </a:fld>
             <a:endParaRPr lang="es-ES"/>
           </a:p>
@@ -1036,6 +1039,327 @@
             <a:fld id="{F6EC932F-7E40-4A9D-860D-8369AEE1ADB1}" type="slidenum">
               <a:rPr lang="es-ES" smtClean="0"/>
               <a:t>12</a:t>
+            </a:fld>
+            <a:endParaRPr lang="es-ES"/>
+          </a:p>
+        </p:txBody>
+      </p:sp>
+      <p:sp>
+        <p:nvSpPr>
+          <p:cNvPr id="5" name="4 Marcador de encabezado"/>
+          <p:cNvSpPr>
+            <a:spLocks noGrp="1"/>
+          </p:cNvSpPr>
+          <p:nvPr>
+            <p:ph type="hdr" sz="quarter" idx="11"/>
+          </p:nvPr>
+        </p:nvSpPr>
+        <p:spPr/>
+        <p:txBody>
+          <a:bodyPr/>
+          <a:lstStyle/>
+          <a:p>
+            <a:r>
+              <a:rPr lang="es-ES" smtClean="0"/>
+              <a:t>Defensa de tésis de licenciatura</a:t>
+            </a:r>
+            <a:endParaRPr lang="es-ES"/>
+          </a:p>
+        </p:txBody>
+      </p:sp>
+    </p:spTree>
+    <p:extLst>
+      <p:ext uri="{BB962C8B-B14F-4D97-AF65-F5344CB8AC3E}">
+        <p14:creationId xmlns:p14="http://schemas.microsoft.com/office/powerpoint/2010/main" val="1229306465"/>
+      </p:ext>
+    </p:extLst>
+  </p:cSld>
+  <p:clrMapOvr>
+    <a:masterClrMapping/>
+  </p:clrMapOvr>
+</p:notes>
+</file>
+
+<file path=ppt/notesSlides/notesSlide13.xml><?xml version="1.0" encoding="utf-8"?>
+<p:notes xmlns:a="http://schemas.openxmlformats.org/drawingml/2006/main" xmlns:r="http://schemas.openxmlformats.org/officeDocument/2006/relationships" xmlns:p="http://schemas.openxmlformats.org/presentationml/2006/main">
+  <p:cSld>
+    <p:spTree>
+      <p:nvGrpSpPr>
+        <p:cNvPr id="1" name=""/>
+        <p:cNvGrpSpPr/>
+        <p:nvPr/>
+      </p:nvGrpSpPr>
+      <p:grpSpPr>
+        <a:xfrm>
+          <a:off x="0" y="0"/>
+          <a:ext cx="0" cy="0"/>
+          <a:chOff x="0" y="0"/>
+          <a:chExt cx="0" cy="0"/>
+        </a:xfrm>
+      </p:grpSpPr>
+      <p:sp>
+        <p:nvSpPr>
+          <p:cNvPr id="2" name="1 Marcador de imagen de diapositiva"/>
+          <p:cNvSpPr>
+            <a:spLocks noGrp="1" noRot="1" noChangeAspect="1"/>
+          </p:cNvSpPr>
+          <p:nvPr>
+            <p:ph type="sldImg"/>
+          </p:nvPr>
+        </p:nvSpPr>
+        <p:spPr/>
+      </p:sp>
+      <p:sp>
+        <p:nvSpPr>
+          <p:cNvPr id="3" name="2 Marcador de notas"/>
+          <p:cNvSpPr>
+            <a:spLocks noGrp="1"/>
+          </p:cNvSpPr>
+          <p:nvPr>
+            <p:ph type="body" idx="1"/>
+          </p:nvPr>
+        </p:nvSpPr>
+        <p:spPr/>
+        <p:txBody>
+          <a:bodyPr/>
+          <a:lstStyle/>
+          <a:p>
+            <a:endParaRPr lang="es-ES"/>
+          </a:p>
+        </p:txBody>
+      </p:sp>
+      <p:sp>
+        <p:nvSpPr>
+          <p:cNvPr id="4" name="3 Marcador de número de diapositiva"/>
+          <p:cNvSpPr>
+            <a:spLocks noGrp="1"/>
+          </p:cNvSpPr>
+          <p:nvPr>
+            <p:ph type="sldNum" sz="quarter" idx="10"/>
+          </p:nvPr>
+        </p:nvSpPr>
+        <p:spPr/>
+        <p:txBody>
+          <a:bodyPr/>
+          <a:lstStyle/>
+          <a:p>
+            <a:fld id="{F6EC932F-7E40-4A9D-860D-8369AEE1ADB1}" type="slidenum">
+              <a:rPr lang="es-ES" smtClean="0"/>
+              <a:t>13</a:t>
+            </a:fld>
+            <a:endParaRPr lang="es-ES"/>
+          </a:p>
+        </p:txBody>
+      </p:sp>
+      <p:sp>
+        <p:nvSpPr>
+          <p:cNvPr id="5" name="4 Marcador de encabezado"/>
+          <p:cNvSpPr>
+            <a:spLocks noGrp="1"/>
+          </p:cNvSpPr>
+          <p:nvPr>
+            <p:ph type="hdr" sz="quarter" idx="11"/>
+          </p:nvPr>
+        </p:nvSpPr>
+        <p:spPr/>
+        <p:txBody>
+          <a:bodyPr/>
+          <a:lstStyle/>
+          <a:p>
+            <a:r>
+              <a:rPr lang="es-ES" smtClean="0"/>
+              <a:t>Defensa de tésis de licenciatura</a:t>
+            </a:r>
+            <a:endParaRPr lang="es-ES"/>
+          </a:p>
+        </p:txBody>
+      </p:sp>
+    </p:spTree>
+    <p:extLst>
+      <p:ext uri="{BB962C8B-B14F-4D97-AF65-F5344CB8AC3E}">
+        <p14:creationId xmlns:p14="http://schemas.microsoft.com/office/powerpoint/2010/main" val="1229306465"/>
+      </p:ext>
+    </p:extLst>
+  </p:cSld>
+  <p:clrMapOvr>
+    <a:masterClrMapping/>
+  </p:clrMapOvr>
+</p:notes>
+</file>
+
+<file path=ppt/notesSlides/notesSlide14.xml><?xml version="1.0" encoding="utf-8"?>
+<p:notes xmlns:a="http://schemas.openxmlformats.org/drawingml/2006/main" xmlns:r="http://schemas.openxmlformats.org/officeDocument/2006/relationships" xmlns:p="http://schemas.openxmlformats.org/presentationml/2006/main">
+  <p:cSld>
+    <p:spTree>
+      <p:nvGrpSpPr>
+        <p:cNvPr id="1" name=""/>
+        <p:cNvGrpSpPr/>
+        <p:nvPr/>
+      </p:nvGrpSpPr>
+      <p:grpSpPr>
+        <a:xfrm>
+          <a:off x="0" y="0"/>
+          <a:ext cx="0" cy="0"/>
+          <a:chOff x="0" y="0"/>
+          <a:chExt cx="0" cy="0"/>
+        </a:xfrm>
+      </p:grpSpPr>
+      <p:sp>
+        <p:nvSpPr>
+          <p:cNvPr id="2" name="1 Marcador de imagen de diapositiva"/>
+          <p:cNvSpPr>
+            <a:spLocks noGrp="1" noRot="1" noChangeAspect="1"/>
+          </p:cNvSpPr>
+          <p:nvPr>
+            <p:ph type="sldImg"/>
+          </p:nvPr>
+        </p:nvSpPr>
+        <p:spPr/>
+      </p:sp>
+      <p:sp>
+        <p:nvSpPr>
+          <p:cNvPr id="3" name="2 Marcador de notas"/>
+          <p:cNvSpPr>
+            <a:spLocks noGrp="1"/>
+          </p:cNvSpPr>
+          <p:nvPr>
+            <p:ph type="body" idx="1"/>
+          </p:nvPr>
+        </p:nvSpPr>
+        <p:spPr/>
+        <p:txBody>
+          <a:bodyPr/>
+          <a:lstStyle/>
+          <a:p>
+            <a:endParaRPr lang="es-ES"/>
+          </a:p>
+        </p:txBody>
+      </p:sp>
+      <p:sp>
+        <p:nvSpPr>
+          <p:cNvPr id="4" name="3 Marcador de número de diapositiva"/>
+          <p:cNvSpPr>
+            <a:spLocks noGrp="1"/>
+          </p:cNvSpPr>
+          <p:nvPr>
+            <p:ph type="sldNum" sz="quarter" idx="10"/>
+          </p:nvPr>
+        </p:nvSpPr>
+        <p:spPr/>
+        <p:txBody>
+          <a:bodyPr/>
+          <a:lstStyle/>
+          <a:p>
+            <a:fld id="{F6EC932F-7E40-4A9D-860D-8369AEE1ADB1}" type="slidenum">
+              <a:rPr lang="es-ES" smtClean="0"/>
+              <a:t>14</a:t>
+            </a:fld>
+            <a:endParaRPr lang="es-ES"/>
+          </a:p>
+        </p:txBody>
+      </p:sp>
+      <p:sp>
+        <p:nvSpPr>
+          <p:cNvPr id="5" name="4 Marcador de encabezado"/>
+          <p:cNvSpPr>
+            <a:spLocks noGrp="1"/>
+          </p:cNvSpPr>
+          <p:nvPr>
+            <p:ph type="hdr" sz="quarter" idx="11"/>
+          </p:nvPr>
+        </p:nvSpPr>
+        <p:spPr/>
+        <p:txBody>
+          <a:bodyPr/>
+          <a:lstStyle/>
+          <a:p>
+            <a:r>
+              <a:rPr lang="es-ES" smtClean="0"/>
+              <a:t>Defensa de tésis de licenciatura</a:t>
+            </a:r>
+            <a:endParaRPr lang="es-ES"/>
+          </a:p>
+        </p:txBody>
+      </p:sp>
+    </p:spTree>
+    <p:extLst>
+      <p:ext uri="{BB962C8B-B14F-4D97-AF65-F5344CB8AC3E}">
+        <p14:creationId xmlns:p14="http://schemas.microsoft.com/office/powerpoint/2010/main" val="1229306465"/>
+      </p:ext>
+    </p:extLst>
+  </p:cSld>
+  <p:clrMapOvr>
+    <a:masterClrMapping/>
+  </p:clrMapOvr>
+</p:notes>
+</file>
+
+<file path=ppt/notesSlides/notesSlide15.xml><?xml version="1.0" encoding="utf-8"?>
+<p:notes xmlns:a="http://schemas.openxmlformats.org/drawingml/2006/main" xmlns:r="http://schemas.openxmlformats.org/officeDocument/2006/relationships" xmlns:p="http://schemas.openxmlformats.org/presentationml/2006/main">
+  <p:cSld>
+    <p:spTree>
+      <p:nvGrpSpPr>
+        <p:cNvPr id="1" name=""/>
+        <p:cNvGrpSpPr/>
+        <p:nvPr/>
+      </p:nvGrpSpPr>
+      <p:grpSpPr>
+        <a:xfrm>
+          <a:off x="0" y="0"/>
+          <a:ext cx="0" cy="0"/>
+          <a:chOff x="0" y="0"/>
+          <a:chExt cx="0" cy="0"/>
+        </a:xfrm>
+      </p:grpSpPr>
+      <p:sp>
+        <p:nvSpPr>
+          <p:cNvPr id="2" name="1 Marcador de imagen de diapositiva"/>
+          <p:cNvSpPr>
+            <a:spLocks noGrp="1" noRot="1" noChangeAspect="1"/>
+          </p:cNvSpPr>
+          <p:nvPr>
+            <p:ph type="sldImg"/>
+          </p:nvPr>
+        </p:nvSpPr>
+        <p:spPr/>
+      </p:sp>
+      <p:sp>
+        <p:nvSpPr>
+          <p:cNvPr id="3" name="2 Marcador de notas"/>
+          <p:cNvSpPr>
+            <a:spLocks noGrp="1"/>
+          </p:cNvSpPr>
+          <p:nvPr>
+            <p:ph type="body" idx="1"/>
+          </p:nvPr>
+        </p:nvSpPr>
+        <p:spPr/>
+        <p:txBody>
+          <a:bodyPr/>
+          <a:lstStyle/>
+          <a:p>
+            <a:endParaRPr lang="es-ES"/>
+          </a:p>
+        </p:txBody>
+      </p:sp>
+      <p:sp>
+        <p:nvSpPr>
+          <p:cNvPr id="4" name="3 Marcador de número de diapositiva"/>
+          <p:cNvSpPr>
+            <a:spLocks noGrp="1"/>
+          </p:cNvSpPr>
+          <p:nvPr>
+            <p:ph type="sldNum" sz="quarter" idx="10"/>
+          </p:nvPr>
+        </p:nvSpPr>
+        <p:spPr/>
+        <p:txBody>
+          <a:bodyPr/>
+          <a:lstStyle/>
+          <a:p>
+            <a:fld id="{F6EC932F-7E40-4A9D-860D-8369AEE1ADB1}" type="slidenum">
+              <a:rPr lang="es-ES" smtClean="0"/>
+              <a:t>15</a:t>
             </a:fld>
             <a:endParaRPr lang="es-ES"/>
           </a:p>
@@ -5288,13 +5612,7 @@
               <a:rPr lang="es-ES" sz="3200" dirty="0" smtClean="0">
                 <a:latin typeface="+mj-lt"/>
               </a:rPr>
-              <a:t>Una vez generados los estímulos</a:t>
-            </a:r>
-            <a:r>
-              <a:rPr lang="es-ES" sz="3200" dirty="0" smtClean="0">
-                <a:latin typeface="+mj-lt"/>
-              </a:rPr>
-              <a:t>, necesitábamos una interfaz para medir el desempeño de los sujetos.</a:t>
+              <a:t>Una vez generados los estímulos, necesitábamos una interfaz para medir el desempeño de los sujetos.</a:t>
             </a:r>
             <a:endParaRPr lang="es-ES" sz="3200" dirty="0">
               <a:latin typeface="+mj-lt"/>
@@ -5451,13 +5769,7 @@
               <a:rPr lang="es-ES" sz="3200" dirty="0" smtClean="0">
                 <a:latin typeface="+mj-lt"/>
               </a:rPr>
-              <a:t>Una vez generados los estímulos</a:t>
-            </a:r>
-            <a:r>
-              <a:rPr lang="es-ES" sz="3200" dirty="0" smtClean="0">
-                <a:latin typeface="+mj-lt"/>
-              </a:rPr>
-              <a:t>, necesitábamos una interfaz para medir el desempeño de los sujetos.</a:t>
+              <a:t>Una vez generados los estímulos, necesitábamos una interfaz para medir el desempeño de los sujetos.</a:t>
             </a:r>
             <a:endParaRPr lang="es-ES" sz="3200" dirty="0">
               <a:latin typeface="+mj-lt"/>
@@ -5497,19 +5809,7 @@
             <a:pPr algn="ctr"/>
             <a:r>
               <a:rPr lang="es-ES" sz="2000" dirty="0" smtClean="0"/>
-              <a:t>Desarrollar este software fue </a:t>
-            </a:r>
-            <a:r>
-              <a:rPr lang="es-ES" sz="2000" dirty="0" smtClean="0"/>
-              <a:t>(medido en tiempo) la </a:t>
-            </a:r>
-            <a:r>
-              <a:rPr lang="es-ES" sz="2000" dirty="0" smtClean="0"/>
-              <a:t>mayor parte del trabajo </a:t>
-            </a:r>
-            <a:r>
-              <a:rPr lang="es-ES" sz="2000" dirty="0" smtClean="0"/>
-              <a:t>realizado.</a:t>
+              <a:t>Desarrollar este software fue (medido en tiempo) la mayor parte del trabajo realizado.</a:t>
             </a:r>
             <a:endParaRPr lang="es-ES" sz="2000" dirty="0"/>
           </a:p>
@@ -5675,7 +5975,7 @@
         </p:nvSpPr>
         <p:spPr>
           <a:xfrm>
-            <a:off x="1" y="323945"/>
+            <a:off x="1" y="457508"/>
             <a:ext cx="9143999" cy="584775"/>
           </a:xfrm>
           <a:prstGeom prst="rect">
@@ -5694,7 +5994,7 @@
               <a:rPr lang="es-ES" sz="3200" dirty="0" smtClean="0">
                 <a:latin typeface="+mj-lt"/>
               </a:rPr>
-              <a:t>La invariancia (o no) frente a rotaciones.</a:t>
+              <a:t>Primeros resultados</a:t>
             </a:r>
             <a:endParaRPr lang="es-ES" sz="3200" dirty="0">
               <a:latin typeface="+mj-lt"/>
@@ -5797,9 +6097,75 @@
           </a:p>
         </p:txBody>
       </p:sp>
+      <p:sp>
+        <p:nvSpPr>
+          <p:cNvPr id="7" name="6 CuadroTexto"/>
+          <p:cNvSpPr txBox="1"/>
+          <p:nvPr/>
+        </p:nvSpPr>
+        <p:spPr>
+          <a:xfrm>
+            <a:off x="24808" y="3968482"/>
+            <a:ext cx="5007525" cy="369332"/>
+          </a:xfrm>
+          <a:prstGeom prst="rect">
+            <a:avLst/>
+          </a:prstGeom>
+          <a:noFill/>
+        </p:spPr>
+        <p:txBody>
+          <a:bodyPr wrap="none" rtlCol="0">
+            <a:spAutoFit/>
+          </a:bodyPr>
+          <a:lstStyle/>
+          <a:p>
+            <a:r>
+              <a:rPr lang="es-ES" dirty="0" smtClean="0"/>
+              <a:t>Ejemplo de resultados obtenidos en la etapa inicial:</a:t>
+            </a:r>
+            <a:endParaRPr lang="es-ES" dirty="0"/>
+          </a:p>
+        </p:txBody>
+      </p:sp>
+      <p:sp>
+        <p:nvSpPr>
+          <p:cNvPr id="11" name="10 CuadroTexto"/>
+          <p:cNvSpPr txBox="1"/>
+          <p:nvPr/>
+        </p:nvSpPr>
+        <p:spPr>
+          <a:xfrm>
+            <a:off x="-5824" y="6093296"/>
+            <a:ext cx="9149822" cy="646331"/>
+          </a:xfrm>
+          <a:prstGeom prst="rect">
+            <a:avLst/>
+          </a:prstGeom>
+          <a:noFill/>
+        </p:spPr>
+        <p:txBody>
+          <a:bodyPr wrap="square" rtlCol="0">
+            <a:spAutoFit/>
+          </a:bodyPr>
+          <a:lstStyle/>
+          <a:p>
+            <a:r>
+              <a:rPr lang="es-ES" dirty="0" smtClean="0"/>
+              <a:t>Conclusión: Necesitábamos caracterizar la dificultad de percibir características geométricas sin conocer a priori las capacidades de los sujetos. -</a:t>
+            </a:r>
+            <a:r>
+              <a:rPr lang="es-ES" dirty="0" smtClean="0">
+                <a:sym typeface="Wingdings" pitchFamily="2" charset="2"/>
+              </a:rPr>
+              <a:t>--&gt; Medición de umbral de detección.</a:t>
+            </a:r>
+            <a:endParaRPr lang="es-ES" dirty="0"/>
+          </a:p>
+        </p:txBody>
+      </p:sp>
       <p:pic>
         <p:nvPicPr>
-          <p:cNvPr id="5" name="4 Imagen"/>
+          <p:cNvPr id="4" name="3 Imagen"/>
           <p:cNvPicPr>
             <a:picLocks noChangeAspect="1"/>
           </p:cNvPicPr>
@@ -5819,84 +6185,2145 @@
         </p:blipFill>
         <p:spPr>
           <a:xfrm>
-            <a:off x="-2" y="4365104"/>
-            <a:ext cx="9144000" cy="1141770"/>
+            <a:off x="1" y="4359671"/>
+            <a:ext cx="9144000" cy="1720085"/>
           </a:xfrm>
           <a:prstGeom prst="rect">
             <a:avLst/>
           </a:prstGeom>
         </p:spPr>
       </p:pic>
-      <p:sp>
-        <p:nvSpPr>
-          <p:cNvPr id="7" name="6 CuadroTexto"/>
-          <p:cNvSpPr txBox="1"/>
-          <p:nvPr/>
-        </p:nvSpPr>
-        <p:spPr>
-          <a:xfrm>
-            <a:off x="24808" y="3968482"/>
-            <a:ext cx="5007525" cy="369332"/>
-          </a:xfrm>
-          <a:prstGeom prst="rect">
-            <a:avLst/>
-          </a:prstGeom>
-          <a:noFill/>
-        </p:spPr>
-        <p:txBody>
-          <a:bodyPr wrap="none" rtlCol="0">
-            <a:spAutoFit/>
-          </a:bodyPr>
-          <a:lstStyle/>
-          <a:p>
-            <a:r>
-              <a:rPr lang="es-ES" dirty="0" smtClean="0"/>
-              <a:t>Ejemplo de resultados obtenidos en la etapa inicial:</a:t>
-            </a:r>
-            <a:endParaRPr lang="es-ES" dirty="0"/>
-          </a:p>
-        </p:txBody>
-      </p:sp>
-      <p:sp>
-        <p:nvSpPr>
-          <p:cNvPr id="11" name="10 CuadroTexto"/>
-          <p:cNvSpPr txBox="1"/>
-          <p:nvPr/>
-        </p:nvSpPr>
-        <p:spPr>
-          <a:xfrm>
-            <a:off x="0" y="5710051"/>
-            <a:ext cx="9143999" cy="646331"/>
-          </a:xfrm>
-          <a:prstGeom prst="rect">
-            <a:avLst/>
-          </a:prstGeom>
-          <a:noFill/>
-        </p:spPr>
-        <p:txBody>
-          <a:bodyPr wrap="square" rtlCol="0">
-            <a:spAutoFit/>
-          </a:bodyPr>
-          <a:lstStyle/>
-          <a:p>
-            <a:r>
-              <a:rPr lang="es-ES" dirty="0" smtClean="0"/>
-              <a:t>Conclusión: Necesitábamos caracterizar la dificultad de percibir características geométricas sin conocer a priori las capacidades de los sujetos. -</a:t>
-            </a:r>
-            <a:r>
-              <a:rPr lang="es-ES" dirty="0" smtClean="0">
-                <a:sym typeface="Wingdings" pitchFamily="2" charset="2"/>
-              </a:rPr>
-              <a:t>--&gt; Medición de umbral de detección.</a:t>
-            </a:r>
-            <a:endParaRPr lang="es-ES" dirty="0"/>
-          </a:p>
-        </p:txBody>
-      </p:sp>
     </p:spTree>
     <p:extLst>
       <p:ext uri="{BB962C8B-B14F-4D97-AF65-F5344CB8AC3E}">
         <p14:creationId xmlns:p14="http://schemas.microsoft.com/office/powerpoint/2010/main" val="999737451"/>
+      </p:ext>
+    </p:extLst>
+  </p:cSld>
+  <p:clrMapOvr>
+    <a:masterClrMapping/>
+  </p:clrMapOvr>
+  <p:timing>
+    <p:tnLst>
+      <p:par>
+        <p:cTn id="1" dur="indefinite" restart="never" nodeType="tmRoot"/>
+      </p:par>
+    </p:tnLst>
+  </p:timing>
+</p:sld>
+</file>
+
+<file path=ppt/slides/slide13.xml><?xml version="1.0" encoding="utf-8"?>
+<p:sld xmlns:a="http://schemas.openxmlformats.org/drawingml/2006/main" xmlns:r="http://schemas.openxmlformats.org/officeDocument/2006/relationships" xmlns:p="http://schemas.openxmlformats.org/presentationml/2006/main">
+  <p:cSld>
+    <p:spTree>
+      <p:nvGrpSpPr>
+        <p:cNvPr id="1" name=""/>
+        <p:cNvGrpSpPr/>
+        <p:nvPr/>
+      </p:nvGrpSpPr>
+      <p:grpSpPr>
+        <a:xfrm>
+          <a:off x="0" y="0"/>
+          <a:ext cx="0" cy="0"/>
+          <a:chOff x="0" y="0"/>
+          <a:chExt cx="0" cy="0"/>
+        </a:xfrm>
+      </p:grpSpPr>
+      <p:sp>
+        <p:nvSpPr>
+          <p:cNvPr id="3" name="2 CuadroTexto"/>
+          <p:cNvSpPr txBox="1"/>
+          <p:nvPr/>
+        </p:nvSpPr>
+        <p:spPr>
+          <a:xfrm>
+            <a:off x="0" y="-1"/>
+            <a:ext cx="2987825" cy="307777"/>
+          </a:xfrm>
+          <a:prstGeom prst="rect">
+            <a:avLst/>
+          </a:prstGeom>
+          <a:noFill/>
+        </p:spPr>
+        <p:txBody>
+          <a:bodyPr wrap="square" rtlCol="0">
+            <a:spAutoFit/>
+          </a:bodyPr>
+          <a:lstStyle/>
+          <a:p>
+            <a:r>
+              <a:rPr lang="es-ES" sz="1400" dirty="0" smtClean="0">
+                <a:solidFill>
+                  <a:schemeClr val="bg1">
+                    <a:lumMod val="50000"/>
+                  </a:schemeClr>
+                </a:solidFill>
+              </a:rPr>
+              <a:t>Herramientas desarrolladas </a:t>
+            </a:r>
+            <a:endParaRPr lang="es-ES" sz="1400" dirty="0">
+              <a:solidFill>
+                <a:schemeClr val="bg1">
+                  <a:lumMod val="50000"/>
+                </a:schemeClr>
+              </a:solidFill>
+            </a:endParaRPr>
+          </a:p>
+        </p:txBody>
+      </p:sp>
+      <p:sp>
+        <p:nvSpPr>
+          <p:cNvPr id="6" name="5 CuadroTexto"/>
+          <p:cNvSpPr txBox="1"/>
+          <p:nvPr/>
+        </p:nvSpPr>
+        <p:spPr>
+          <a:xfrm>
+            <a:off x="6156175" y="0"/>
+            <a:ext cx="2987825" cy="307777"/>
+          </a:xfrm>
+          <a:prstGeom prst="rect">
+            <a:avLst/>
+          </a:prstGeom>
+          <a:noFill/>
+        </p:spPr>
+        <p:txBody>
+          <a:bodyPr wrap="square" rtlCol="0">
+            <a:spAutoFit/>
+          </a:bodyPr>
+          <a:lstStyle/>
+          <a:p>
+            <a:pPr algn="r"/>
+            <a:r>
+              <a:rPr lang="es-ES" sz="1400" dirty="0" smtClean="0">
+                <a:solidFill>
+                  <a:schemeClr val="bg1">
+                    <a:lumMod val="50000"/>
+                  </a:schemeClr>
+                </a:solidFill>
+              </a:rPr>
+              <a:t>Defensa de tesis – Diciembre 2016</a:t>
+            </a:r>
+            <a:endParaRPr lang="es-ES" sz="1400" dirty="0">
+              <a:solidFill>
+                <a:schemeClr val="bg1">
+                  <a:lumMod val="50000"/>
+                </a:schemeClr>
+              </a:solidFill>
+            </a:endParaRPr>
+          </a:p>
+        </p:txBody>
+      </p:sp>
+      <p:sp>
+        <p:nvSpPr>
+          <p:cNvPr id="8" name="7 CuadroTexto"/>
+          <p:cNvSpPr txBox="1"/>
+          <p:nvPr/>
+        </p:nvSpPr>
+        <p:spPr>
+          <a:xfrm>
+            <a:off x="1" y="323945"/>
+            <a:ext cx="9143999" cy="584775"/>
+          </a:xfrm>
+          <a:prstGeom prst="rect">
+            <a:avLst/>
+          </a:prstGeom>
+          <a:noFill/>
+        </p:spPr>
+        <p:txBody>
+          <a:bodyPr wrap="square" rtlCol="0">
+            <a:spAutoFit/>
+          </a:bodyPr>
+          <a:lstStyle/>
+          <a:p>
+            <a:pPr algn="ctr"/>
+            <a:r>
+              <a:rPr lang="es-ES" sz="3200" dirty="0" smtClean="0">
+                <a:latin typeface="+mj-lt"/>
+              </a:rPr>
+              <a:t>Algoritmos tipo </a:t>
+            </a:r>
+            <a:r>
+              <a:rPr lang="es-ES" sz="3200" dirty="0" err="1" smtClean="0">
+                <a:latin typeface="+mj-lt"/>
+              </a:rPr>
+              <a:t>staircase</a:t>
+            </a:r>
+            <a:endParaRPr lang="es-ES" sz="3200" dirty="0">
+              <a:latin typeface="+mj-lt"/>
+            </a:endParaRPr>
+          </a:p>
+        </p:txBody>
+      </p:sp>
+      <p:pic>
+        <p:nvPicPr>
+          <p:cNvPr id="5" name="4 Imagen"/>
+          <p:cNvPicPr>
+            <a:picLocks noChangeAspect="1"/>
+          </p:cNvPicPr>
+          <p:nvPr/>
+        </p:nvPicPr>
+        <p:blipFill>
+          <a:blip r:embed="rId3" cstate="print">
+            <a:extLst>
+              <a:ext uri="{28A0092B-C50C-407E-A947-70E740481C1C}">
+                <a14:useLocalDpi xmlns:a14="http://schemas.microsoft.com/office/drawing/2010/main" val="0"/>
+              </a:ext>
+            </a:extLst>
+          </a:blip>
+          <a:stretch>
+            <a:fillRect/>
+          </a:stretch>
+        </p:blipFill>
+        <p:spPr>
+          <a:xfrm>
+            <a:off x="3772997" y="2061369"/>
+            <a:ext cx="5175543" cy="3970783"/>
+          </a:xfrm>
+          <a:prstGeom prst="rect">
+            <a:avLst/>
+          </a:prstGeom>
+        </p:spPr>
+      </p:pic>
+      <p:pic>
+        <p:nvPicPr>
+          <p:cNvPr id="10" name="9 Imagen"/>
+          <p:cNvPicPr>
+            <a:picLocks noChangeAspect="1"/>
+          </p:cNvPicPr>
+          <p:nvPr/>
+        </p:nvPicPr>
+        <p:blipFill>
+          <a:blip r:embed="rId4">
+            <a:extLst>
+              <a:ext uri="{28A0092B-C50C-407E-A947-70E740481C1C}">
+                <a14:useLocalDpi xmlns:a14="http://schemas.microsoft.com/office/drawing/2010/main" val="0"/>
+              </a:ext>
+            </a:extLst>
+          </a:blip>
+          <a:stretch>
+            <a:fillRect/>
+          </a:stretch>
+        </p:blipFill>
+        <p:spPr>
+          <a:xfrm>
+            <a:off x="423150" y="5229200"/>
+            <a:ext cx="923925" cy="923925"/>
+          </a:xfrm>
+          <a:prstGeom prst="rect">
+            <a:avLst/>
+          </a:prstGeom>
+        </p:spPr>
+      </p:pic>
+      <p:pic>
+        <p:nvPicPr>
+          <p:cNvPr id="12" name="11 Imagen"/>
+          <p:cNvPicPr>
+            <a:picLocks noChangeAspect="1"/>
+          </p:cNvPicPr>
+          <p:nvPr/>
+        </p:nvPicPr>
+        <p:blipFill>
+          <a:blip r:embed="rId5">
+            <a:extLst>
+              <a:ext uri="{28A0092B-C50C-407E-A947-70E740481C1C}">
+                <a14:useLocalDpi xmlns:a14="http://schemas.microsoft.com/office/drawing/2010/main" val="0"/>
+              </a:ext>
+            </a:extLst>
+          </a:blip>
+          <a:stretch>
+            <a:fillRect/>
+          </a:stretch>
+        </p:blipFill>
+        <p:spPr>
+          <a:xfrm>
+            <a:off x="2430810" y="5146327"/>
+            <a:ext cx="885825" cy="885825"/>
+          </a:xfrm>
+          <a:prstGeom prst="rect">
+            <a:avLst/>
+          </a:prstGeom>
+        </p:spPr>
+      </p:pic>
+      <p:pic>
+        <p:nvPicPr>
+          <p:cNvPr id="13" name="12 Imagen"/>
+          <p:cNvPicPr>
+            <a:picLocks noChangeAspect="1"/>
+          </p:cNvPicPr>
+          <p:nvPr/>
+        </p:nvPicPr>
+        <p:blipFill>
+          <a:blip r:embed="rId6">
+            <a:extLst>
+              <a:ext uri="{28A0092B-C50C-407E-A947-70E740481C1C}">
+                <a14:useLocalDpi xmlns:a14="http://schemas.microsoft.com/office/drawing/2010/main" val="0"/>
+              </a:ext>
+            </a:extLst>
+          </a:blip>
+          <a:stretch>
+            <a:fillRect/>
+          </a:stretch>
+        </p:blipFill>
+        <p:spPr>
+          <a:xfrm>
+            <a:off x="423150" y="4213762"/>
+            <a:ext cx="904875" cy="876300"/>
+          </a:xfrm>
+          <a:prstGeom prst="rect">
+            <a:avLst/>
+          </a:prstGeom>
+        </p:spPr>
+      </p:pic>
+      <p:pic>
+        <p:nvPicPr>
+          <p:cNvPr id="14" name="13 Imagen"/>
+          <p:cNvPicPr>
+            <a:picLocks noChangeAspect="1"/>
+          </p:cNvPicPr>
+          <p:nvPr/>
+        </p:nvPicPr>
+        <p:blipFill>
+          <a:blip r:embed="rId7">
+            <a:extLst>
+              <a:ext uri="{28A0092B-C50C-407E-A947-70E740481C1C}">
+                <a14:useLocalDpi xmlns:a14="http://schemas.microsoft.com/office/drawing/2010/main" val="0"/>
+              </a:ext>
+            </a:extLst>
+          </a:blip>
+          <a:stretch>
+            <a:fillRect/>
+          </a:stretch>
+        </p:blipFill>
+        <p:spPr>
+          <a:xfrm>
+            <a:off x="2411760" y="4204237"/>
+            <a:ext cx="885825" cy="895350"/>
+          </a:xfrm>
+          <a:prstGeom prst="rect">
+            <a:avLst/>
+          </a:prstGeom>
+        </p:spPr>
+      </p:pic>
+      <p:pic>
+        <p:nvPicPr>
+          <p:cNvPr id="15" name="14 Imagen"/>
+          <p:cNvPicPr>
+            <a:picLocks noChangeAspect="1"/>
+          </p:cNvPicPr>
+          <p:nvPr/>
+        </p:nvPicPr>
+        <p:blipFill>
+          <a:blip r:embed="rId8">
+            <a:extLst>
+              <a:ext uri="{28A0092B-C50C-407E-A947-70E740481C1C}">
+                <a14:useLocalDpi xmlns:a14="http://schemas.microsoft.com/office/drawing/2010/main" val="0"/>
+              </a:ext>
+            </a:extLst>
+          </a:blip>
+          <a:stretch>
+            <a:fillRect/>
+          </a:stretch>
+        </p:blipFill>
+        <p:spPr>
+          <a:xfrm>
+            <a:off x="2411760" y="3319425"/>
+            <a:ext cx="904875" cy="895350"/>
+          </a:xfrm>
+          <a:prstGeom prst="rect">
+            <a:avLst/>
+          </a:prstGeom>
+        </p:spPr>
+      </p:pic>
+      <p:pic>
+        <p:nvPicPr>
+          <p:cNvPr id="16" name="15 Imagen"/>
+          <p:cNvPicPr>
+            <a:picLocks noChangeAspect="1"/>
+          </p:cNvPicPr>
+          <p:nvPr/>
+        </p:nvPicPr>
+        <p:blipFill>
+          <a:blip r:embed="rId9">
+            <a:extLst>
+              <a:ext uri="{28A0092B-C50C-407E-A947-70E740481C1C}">
+                <a14:useLocalDpi xmlns:a14="http://schemas.microsoft.com/office/drawing/2010/main" val="0"/>
+              </a:ext>
+            </a:extLst>
+          </a:blip>
+          <a:stretch>
+            <a:fillRect/>
+          </a:stretch>
+        </p:blipFill>
+        <p:spPr>
+          <a:xfrm>
+            <a:off x="423150" y="3309900"/>
+            <a:ext cx="847725" cy="904875"/>
+          </a:xfrm>
+          <a:prstGeom prst="rect">
+            <a:avLst/>
+          </a:prstGeom>
+        </p:spPr>
+      </p:pic>
+      <p:pic>
+        <p:nvPicPr>
+          <p:cNvPr id="17" name="16 Imagen"/>
+          <p:cNvPicPr>
+            <a:picLocks noChangeAspect="1"/>
+          </p:cNvPicPr>
+          <p:nvPr/>
+        </p:nvPicPr>
+        <p:blipFill>
+          <a:blip r:embed="rId10">
+            <a:extLst>
+              <a:ext uri="{28A0092B-C50C-407E-A947-70E740481C1C}">
+                <a14:useLocalDpi xmlns:a14="http://schemas.microsoft.com/office/drawing/2010/main" val="0"/>
+              </a:ext>
+            </a:extLst>
+          </a:blip>
+          <a:stretch>
+            <a:fillRect/>
+          </a:stretch>
+        </p:blipFill>
+        <p:spPr>
+          <a:xfrm>
+            <a:off x="1475656" y="2067694"/>
+            <a:ext cx="876300" cy="857250"/>
+          </a:xfrm>
+          <a:prstGeom prst="rect">
+            <a:avLst/>
+          </a:prstGeom>
+        </p:spPr>
+      </p:pic>
+      <p:sp>
+        <p:nvSpPr>
+          <p:cNvPr id="18" name="17 CuadroTexto"/>
+          <p:cNvSpPr txBox="1"/>
+          <p:nvPr/>
+        </p:nvSpPr>
+        <p:spPr>
+          <a:xfrm>
+            <a:off x="1172673" y="1795972"/>
+            <a:ext cx="1681999" cy="369332"/>
+          </a:xfrm>
+          <a:prstGeom prst="rect">
+            <a:avLst/>
+          </a:prstGeom>
+          <a:noFill/>
+        </p:spPr>
+        <p:txBody>
+          <a:bodyPr wrap="none" rtlCol="0">
+            <a:spAutoFit/>
+          </a:bodyPr>
+          <a:lstStyle/>
+          <a:p>
+            <a:r>
+              <a:rPr lang="es-ES" dirty="0" smtClean="0"/>
+              <a:t>Estimulo neutro</a:t>
+            </a:r>
+            <a:endParaRPr lang="es-ES" dirty="0"/>
+          </a:p>
+        </p:txBody>
+      </p:sp>
+      <p:sp>
+        <p:nvSpPr>
+          <p:cNvPr id="19" name="18 CuadroTexto"/>
+          <p:cNvSpPr txBox="1"/>
+          <p:nvPr/>
+        </p:nvSpPr>
+        <p:spPr>
+          <a:xfrm>
+            <a:off x="903593" y="2924944"/>
+            <a:ext cx="2020425" cy="369332"/>
+          </a:xfrm>
+          <a:prstGeom prst="rect">
+            <a:avLst/>
+          </a:prstGeom>
+          <a:noFill/>
+        </p:spPr>
+        <p:txBody>
+          <a:bodyPr wrap="none" rtlCol="0">
+            <a:spAutoFit/>
+          </a:bodyPr>
+          <a:lstStyle/>
+          <a:p>
+            <a:r>
+              <a:rPr lang="es-ES" dirty="0" err="1" smtClean="0"/>
+              <a:t>Estimulos</a:t>
+            </a:r>
+            <a:r>
+              <a:rPr lang="es-ES" dirty="0" smtClean="0"/>
+              <a:t> con señal</a:t>
+            </a:r>
+            <a:endParaRPr lang="es-ES" dirty="0"/>
+          </a:p>
+        </p:txBody>
+      </p:sp>
+      <p:cxnSp>
+        <p:nvCxnSpPr>
+          <p:cNvPr id="21" name="20 Conector recto de flecha"/>
+          <p:cNvCxnSpPr/>
+          <p:nvPr/>
+        </p:nvCxnSpPr>
+        <p:spPr>
+          <a:xfrm>
+            <a:off x="1835696" y="3645024"/>
+            <a:ext cx="0" cy="2232248"/>
+          </a:xfrm>
+          <a:prstGeom prst="straightConnector1">
+            <a:avLst/>
+          </a:prstGeom>
+          <a:ln w="57150">
+            <a:tailEnd type="arrow"/>
+          </a:ln>
+        </p:spPr>
+        <p:style>
+          <a:lnRef idx="1">
+            <a:schemeClr val="accent1"/>
+          </a:lnRef>
+          <a:fillRef idx="0">
+            <a:schemeClr val="accent1"/>
+          </a:fillRef>
+          <a:effectRef idx="0">
+            <a:schemeClr val="accent1"/>
+          </a:effectRef>
+          <a:fontRef idx="minor">
+            <a:schemeClr val="tx1"/>
+          </a:fontRef>
+        </p:style>
+      </p:cxnSp>
+      <p:sp>
+        <p:nvSpPr>
+          <p:cNvPr id="22" name="21 CuadroTexto"/>
+          <p:cNvSpPr txBox="1"/>
+          <p:nvPr/>
+        </p:nvSpPr>
+        <p:spPr>
+          <a:xfrm>
+            <a:off x="1388839" y="3914480"/>
+            <a:ext cx="461665" cy="1242712"/>
+          </a:xfrm>
+          <a:prstGeom prst="rect">
+            <a:avLst/>
+          </a:prstGeom>
+          <a:noFill/>
+        </p:spPr>
+        <p:txBody>
+          <a:bodyPr vert="vert270" wrap="none" rtlCol="0">
+            <a:spAutoFit/>
+          </a:bodyPr>
+          <a:lstStyle/>
+          <a:p>
+            <a:r>
+              <a:rPr lang="es-ES" dirty="0" smtClean="0"/>
+              <a:t>Mayor señal</a:t>
+            </a:r>
+            <a:endParaRPr lang="es-ES" dirty="0"/>
+          </a:p>
+        </p:txBody>
+      </p:sp>
+      <p:sp>
+        <p:nvSpPr>
+          <p:cNvPr id="23" name="22 CuadroTexto"/>
+          <p:cNvSpPr txBox="1"/>
+          <p:nvPr/>
+        </p:nvSpPr>
+        <p:spPr>
+          <a:xfrm>
+            <a:off x="1763688" y="3789040"/>
+            <a:ext cx="461665" cy="1658852"/>
+          </a:xfrm>
+          <a:prstGeom prst="rect">
+            <a:avLst/>
+          </a:prstGeom>
+          <a:noFill/>
+        </p:spPr>
+        <p:txBody>
+          <a:bodyPr vert="vert270" wrap="none" rtlCol="0">
+            <a:spAutoFit/>
+          </a:bodyPr>
+          <a:lstStyle/>
+          <a:p>
+            <a:r>
+              <a:rPr lang="es-ES" dirty="0" smtClean="0"/>
+              <a:t>Menor dificultad</a:t>
+            </a:r>
+            <a:endParaRPr lang="es-ES" dirty="0"/>
+          </a:p>
+        </p:txBody>
+      </p:sp>
+      <p:sp>
+        <p:nvSpPr>
+          <p:cNvPr id="25" name="24 CuadroTexto"/>
+          <p:cNvSpPr txBox="1"/>
+          <p:nvPr/>
+        </p:nvSpPr>
+        <p:spPr>
+          <a:xfrm>
+            <a:off x="427692" y="1017022"/>
+            <a:ext cx="3171959" cy="615553"/>
+          </a:xfrm>
+          <a:prstGeom prst="rect">
+            <a:avLst/>
+          </a:prstGeom>
+          <a:noFill/>
+        </p:spPr>
+        <p:txBody>
+          <a:bodyPr wrap="none" rtlCol="0">
+            <a:spAutoFit/>
+          </a:bodyPr>
+          <a:lstStyle/>
+          <a:p>
+            <a:r>
+              <a:rPr lang="es-ES" sz="2000" dirty="0" smtClean="0"/>
+              <a:t>Tipos de estímulos utilizados</a:t>
+            </a:r>
+          </a:p>
+          <a:p>
+            <a:pPr algn="ctr"/>
+            <a:r>
+              <a:rPr lang="es-ES" sz="1400" dirty="0" smtClean="0"/>
+              <a:t>8ejemplos para paralelismo9</a:t>
+            </a:r>
+            <a:endParaRPr lang="es-ES" sz="1400" dirty="0"/>
+          </a:p>
+        </p:txBody>
+      </p:sp>
+      <p:sp>
+        <p:nvSpPr>
+          <p:cNvPr id="26" name="25 CuadroTexto"/>
+          <p:cNvSpPr txBox="1"/>
+          <p:nvPr/>
+        </p:nvSpPr>
+        <p:spPr>
+          <a:xfrm>
+            <a:off x="4932040" y="1124744"/>
+            <a:ext cx="3306483" cy="400110"/>
+          </a:xfrm>
+          <a:prstGeom prst="rect">
+            <a:avLst/>
+          </a:prstGeom>
+          <a:noFill/>
+        </p:spPr>
+        <p:txBody>
+          <a:bodyPr wrap="none" rtlCol="0">
+            <a:spAutoFit/>
+          </a:bodyPr>
+          <a:lstStyle/>
+          <a:p>
+            <a:r>
+              <a:rPr lang="es-ES" sz="2000" dirty="0" smtClean="0"/>
+              <a:t>Tipos de resultados obtenidos</a:t>
+            </a:r>
+            <a:endParaRPr lang="es-ES" sz="2000" dirty="0"/>
+          </a:p>
+        </p:txBody>
+      </p:sp>
+      <p:sp>
+        <p:nvSpPr>
+          <p:cNvPr id="27" name="26 CuadroTexto"/>
+          <p:cNvSpPr txBox="1"/>
+          <p:nvPr/>
+        </p:nvSpPr>
+        <p:spPr>
+          <a:xfrm>
+            <a:off x="2339752" y="2329135"/>
+            <a:ext cx="1339790" cy="307777"/>
+          </a:xfrm>
+          <a:prstGeom prst="rect">
+            <a:avLst/>
+          </a:prstGeom>
+          <a:noFill/>
+        </p:spPr>
+        <p:txBody>
+          <a:bodyPr wrap="none" rtlCol="0">
+            <a:spAutoFit/>
+          </a:bodyPr>
+          <a:lstStyle/>
+          <a:p>
+            <a:r>
+              <a:rPr lang="es-ES" sz="1400" dirty="0" err="1" smtClean="0"/>
+              <a:t>Orientacion</a:t>
+            </a:r>
+            <a:r>
+              <a:rPr lang="es-ES" sz="1400" dirty="0" smtClean="0"/>
+              <a:t> 30º</a:t>
+            </a:r>
+            <a:endParaRPr lang="es-ES" sz="1400" dirty="0"/>
+          </a:p>
+        </p:txBody>
+      </p:sp>
+    </p:spTree>
+    <p:extLst>
+      <p:ext uri="{BB962C8B-B14F-4D97-AF65-F5344CB8AC3E}">
+        <p14:creationId xmlns:p14="http://schemas.microsoft.com/office/powerpoint/2010/main" val="2166002153"/>
+      </p:ext>
+    </p:extLst>
+  </p:cSld>
+  <p:clrMapOvr>
+    <a:masterClrMapping/>
+  </p:clrMapOvr>
+  <p:timing>
+    <p:tnLst>
+      <p:par>
+        <p:cTn id="1" dur="indefinite" restart="never" nodeType="tmRoot"/>
+      </p:par>
+    </p:tnLst>
+  </p:timing>
+</p:sld>
+</file>
+
+<file path=ppt/slides/slide14.xml><?xml version="1.0" encoding="utf-8"?>
+<p:sld xmlns:a="http://schemas.openxmlformats.org/drawingml/2006/main" xmlns:r="http://schemas.openxmlformats.org/officeDocument/2006/relationships" xmlns:p="http://schemas.openxmlformats.org/presentationml/2006/main">
+  <p:cSld>
+    <p:spTree>
+      <p:nvGrpSpPr>
+        <p:cNvPr id="1" name=""/>
+        <p:cNvGrpSpPr/>
+        <p:nvPr/>
+      </p:nvGrpSpPr>
+      <p:grpSpPr>
+        <a:xfrm>
+          <a:off x="0" y="0"/>
+          <a:ext cx="0" cy="0"/>
+          <a:chOff x="0" y="0"/>
+          <a:chExt cx="0" cy="0"/>
+        </a:xfrm>
+      </p:grpSpPr>
+      <p:sp>
+        <p:nvSpPr>
+          <p:cNvPr id="3" name="2 CuadroTexto"/>
+          <p:cNvSpPr txBox="1"/>
+          <p:nvPr/>
+        </p:nvSpPr>
+        <p:spPr>
+          <a:xfrm>
+            <a:off x="0" y="-1"/>
+            <a:ext cx="2987825" cy="307777"/>
+          </a:xfrm>
+          <a:prstGeom prst="rect">
+            <a:avLst/>
+          </a:prstGeom>
+          <a:noFill/>
+        </p:spPr>
+        <p:txBody>
+          <a:bodyPr wrap="square" rtlCol="0">
+            <a:spAutoFit/>
+          </a:bodyPr>
+          <a:lstStyle/>
+          <a:p>
+            <a:r>
+              <a:rPr lang="es-ES" sz="1400" dirty="0" smtClean="0">
+                <a:solidFill>
+                  <a:schemeClr val="bg1">
+                    <a:lumMod val="50000"/>
+                  </a:schemeClr>
+                </a:solidFill>
+              </a:rPr>
+              <a:t>resultados</a:t>
+            </a:r>
+            <a:endParaRPr lang="es-ES" sz="1400" dirty="0">
+              <a:solidFill>
+                <a:schemeClr val="bg1">
+                  <a:lumMod val="50000"/>
+                </a:schemeClr>
+              </a:solidFill>
+            </a:endParaRPr>
+          </a:p>
+        </p:txBody>
+      </p:sp>
+      <p:sp>
+        <p:nvSpPr>
+          <p:cNvPr id="6" name="5 CuadroTexto"/>
+          <p:cNvSpPr txBox="1"/>
+          <p:nvPr/>
+        </p:nvSpPr>
+        <p:spPr>
+          <a:xfrm>
+            <a:off x="6156175" y="0"/>
+            <a:ext cx="2987825" cy="307777"/>
+          </a:xfrm>
+          <a:prstGeom prst="rect">
+            <a:avLst/>
+          </a:prstGeom>
+          <a:noFill/>
+        </p:spPr>
+        <p:txBody>
+          <a:bodyPr wrap="square" rtlCol="0">
+            <a:spAutoFit/>
+          </a:bodyPr>
+          <a:lstStyle/>
+          <a:p>
+            <a:pPr algn="r"/>
+            <a:r>
+              <a:rPr lang="es-ES" sz="1400" dirty="0" smtClean="0">
+                <a:solidFill>
+                  <a:schemeClr val="bg1">
+                    <a:lumMod val="50000"/>
+                  </a:schemeClr>
+                </a:solidFill>
+              </a:rPr>
+              <a:t>Defensa de tesis – Diciembre 2016</a:t>
+            </a:r>
+            <a:endParaRPr lang="es-ES" sz="1400" dirty="0">
+              <a:solidFill>
+                <a:schemeClr val="bg1">
+                  <a:lumMod val="50000"/>
+                </a:schemeClr>
+              </a:solidFill>
+            </a:endParaRPr>
+          </a:p>
+        </p:txBody>
+      </p:sp>
+      <p:sp>
+        <p:nvSpPr>
+          <p:cNvPr id="8" name="7 CuadroTexto"/>
+          <p:cNvSpPr txBox="1"/>
+          <p:nvPr/>
+        </p:nvSpPr>
+        <p:spPr>
+          <a:xfrm>
+            <a:off x="-19988" y="548680"/>
+            <a:ext cx="9143999" cy="1015663"/>
+          </a:xfrm>
+          <a:prstGeom prst="rect">
+            <a:avLst/>
+          </a:prstGeom>
+          <a:noFill/>
+        </p:spPr>
+        <p:txBody>
+          <a:bodyPr wrap="square" rtlCol="0">
+            <a:spAutoFit/>
+          </a:bodyPr>
+          <a:lstStyle/>
+          <a:p>
+            <a:pPr algn="ctr"/>
+            <a:r>
+              <a:rPr lang="es-ES" sz="3200" dirty="0" smtClean="0">
+                <a:latin typeface="+mj-lt"/>
+              </a:rPr>
+              <a:t>Primer experimento. </a:t>
+            </a:r>
+          </a:p>
+          <a:p>
+            <a:pPr algn="ctr"/>
+            <a:r>
+              <a:rPr lang="es-ES" sz="2800" dirty="0" smtClean="0">
+                <a:latin typeface="+mj-lt"/>
+              </a:rPr>
+              <a:t>Dependencia del umbral 8paralelimso9 con la </a:t>
+            </a:r>
+            <a:r>
+              <a:rPr lang="es-ES" sz="2800" dirty="0" err="1" smtClean="0">
+                <a:latin typeface="+mj-lt"/>
+              </a:rPr>
+              <a:t>orientacin</a:t>
+            </a:r>
+            <a:endParaRPr lang="es-ES" sz="2800" dirty="0">
+              <a:latin typeface="+mj-lt"/>
+            </a:endParaRPr>
+          </a:p>
+        </p:txBody>
+      </p:sp>
+      <p:pic>
+        <p:nvPicPr>
+          <p:cNvPr id="2" name="1 Imagen"/>
+          <p:cNvPicPr>
+            <a:picLocks noChangeAspect="1"/>
+          </p:cNvPicPr>
+          <p:nvPr/>
+        </p:nvPicPr>
+        <p:blipFill>
+          <a:blip r:embed="rId7">
+            <a:extLst>
+              <a:ext uri="{28A0092B-C50C-407E-A947-70E740481C1C}">
+                <a14:useLocalDpi xmlns:a14="http://schemas.microsoft.com/office/drawing/2010/main" val="0"/>
+              </a:ext>
+            </a:extLst>
+          </a:blip>
+          <a:stretch>
+            <a:fillRect/>
+          </a:stretch>
+        </p:blipFill>
+        <p:spPr>
+          <a:xfrm>
+            <a:off x="0" y="2337447"/>
+            <a:ext cx="9144001" cy="4547937"/>
+          </a:xfrm>
+          <a:prstGeom prst="rect">
+            <a:avLst/>
+          </a:prstGeom>
+        </p:spPr>
+      </p:pic>
+      <p:sp>
+        <p:nvSpPr>
+          <p:cNvPr id="4" name="3 CuadroTexto"/>
+          <p:cNvSpPr txBox="1"/>
+          <p:nvPr/>
+        </p:nvSpPr>
+        <p:spPr>
+          <a:xfrm>
+            <a:off x="611101" y="1774557"/>
+            <a:ext cx="3528851" cy="646331"/>
+          </a:xfrm>
+          <a:prstGeom prst="rect">
+            <a:avLst/>
+          </a:prstGeom>
+          <a:noFill/>
+        </p:spPr>
+        <p:txBody>
+          <a:bodyPr wrap="none" rtlCol="0">
+            <a:spAutoFit/>
+          </a:bodyPr>
+          <a:lstStyle/>
+          <a:p>
+            <a:r>
+              <a:rPr lang="es-ES" dirty="0" smtClean="0"/>
+              <a:t>Resultados para tres mediciones</a:t>
+            </a:r>
+          </a:p>
+          <a:p>
+            <a:r>
+              <a:rPr lang="es-ES" dirty="0" smtClean="0"/>
+              <a:t>8el experimento duraba 4 horas19</a:t>
+            </a:r>
+            <a:endParaRPr lang="es-ES" dirty="0"/>
+          </a:p>
+        </p:txBody>
+      </p:sp>
+      <p:sp>
+        <p:nvSpPr>
+          <p:cNvPr id="24" name="23 CuadroTexto"/>
+          <p:cNvSpPr txBox="1"/>
+          <p:nvPr/>
+        </p:nvSpPr>
+        <p:spPr>
+          <a:xfrm>
+            <a:off x="4788024" y="1913056"/>
+            <a:ext cx="3997633" cy="369332"/>
+          </a:xfrm>
+          <a:prstGeom prst="rect">
+            <a:avLst/>
+          </a:prstGeom>
+          <a:noFill/>
+        </p:spPr>
+        <p:txBody>
+          <a:bodyPr wrap="none" rtlCol="0">
+            <a:spAutoFit/>
+          </a:bodyPr>
+          <a:lstStyle/>
+          <a:p>
+            <a:r>
+              <a:rPr lang="es-ES" dirty="0" err="1" smtClean="0"/>
+              <a:t>Ampliacion</a:t>
+            </a:r>
+            <a:r>
+              <a:rPr lang="es-ES" dirty="0" smtClean="0"/>
+              <a:t> del </a:t>
+            </a:r>
+            <a:r>
+              <a:rPr lang="es-ES" dirty="0" err="1" smtClean="0"/>
+              <a:t>area</a:t>
+            </a:r>
+            <a:r>
+              <a:rPr lang="es-ES" dirty="0" smtClean="0"/>
+              <a:t> central de la imagen</a:t>
+            </a:r>
+            <a:endParaRPr lang="es-ES" dirty="0"/>
+          </a:p>
+        </p:txBody>
+      </p:sp>
+      <p:pic>
+        <p:nvPicPr>
+          <p:cNvPr id="9" name="3223.mp3">
+            <a:hlinkClick r:id="" action="ppaction://media"/>
+          </p:cNvPr>
+          <p:cNvPicPr>
+            <a:picLocks noChangeAspect="1"/>
+          </p:cNvPicPr>
+          <p:nvPr>
+            <a:audioFile r:link="rId2"/>
+            <p:extLst>
+              <p:ext uri="{DAA4B4D4-6D71-4841-9C94-3DE7FCFB9230}">
+                <p14:media xmlns:p14="http://schemas.microsoft.com/office/powerpoint/2010/main" r:embed="rId1"/>
+              </p:ext>
+            </p:extLst>
+          </p:nvPr>
+        </p:nvPicPr>
+        <p:blipFill>
+          <a:blip r:embed="rId8"/>
+          <a:stretch>
+            <a:fillRect/>
+          </a:stretch>
+        </p:blipFill>
+        <p:spPr>
+          <a:xfrm>
+            <a:off x="5851375" y="4611415"/>
+            <a:ext cx="609600" cy="609600"/>
+          </a:xfrm>
+          <a:prstGeom prst="rect">
+            <a:avLst/>
+          </a:prstGeom>
+        </p:spPr>
+      </p:pic>
+      <p:pic>
+        <p:nvPicPr>
+          <p:cNvPr id="11" name="3224.mp3">
+            <a:hlinkClick r:id="" action="ppaction://media"/>
+          </p:cNvPr>
+          <p:cNvPicPr>
+            <a:picLocks noChangeAspect="1"/>
+          </p:cNvPicPr>
+          <p:nvPr>
+            <a:audioFile r:link="rId4"/>
+            <p:extLst>
+              <p:ext uri="{DAA4B4D4-6D71-4841-9C94-3DE7FCFB9230}">
+                <p14:media xmlns:p14="http://schemas.microsoft.com/office/powerpoint/2010/main" r:embed="rId3"/>
+              </p:ext>
+            </p:extLst>
+          </p:nvPr>
+        </p:nvPicPr>
+        <p:blipFill>
+          <a:blip r:embed="rId8"/>
+          <a:stretch>
+            <a:fillRect/>
+          </a:stretch>
+        </p:blipFill>
+        <p:spPr>
+          <a:xfrm>
+            <a:off x="7345287" y="4611415"/>
+            <a:ext cx="609600" cy="609600"/>
+          </a:xfrm>
+          <a:prstGeom prst="rect">
+            <a:avLst/>
+          </a:prstGeom>
+        </p:spPr>
+      </p:pic>
+      <p:pic>
+        <p:nvPicPr>
+          <p:cNvPr id="20" name="3233.mp3">
+            <a:hlinkClick r:id="" action="ppaction://media"/>
+          </p:cNvPr>
+          <p:cNvPicPr>
+            <a:picLocks noChangeAspect="1"/>
+          </p:cNvPicPr>
+          <p:nvPr>
+            <a:audioFile r:link="rId4"/>
+            <p:extLst>
+              <p:ext uri="{DAA4B4D4-6D71-4841-9C94-3DE7FCFB9230}">
+                <p14:media xmlns:p14="http://schemas.microsoft.com/office/powerpoint/2010/main" r:embed="rId3"/>
+              </p:ext>
+            </p:extLst>
+          </p:nvPr>
+        </p:nvPicPr>
+        <p:blipFill>
+          <a:blip r:embed="rId8"/>
+          <a:stretch>
+            <a:fillRect/>
+          </a:stretch>
+        </p:blipFill>
+        <p:spPr>
+          <a:xfrm>
+            <a:off x="5851375" y="3284984"/>
+            <a:ext cx="609600" cy="609600"/>
+          </a:xfrm>
+          <a:prstGeom prst="rect">
+            <a:avLst/>
+          </a:prstGeom>
+        </p:spPr>
+      </p:pic>
+      <p:pic>
+        <p:nvPicPr>
+          <p:cNvPr id="27" name="3234.mp3">
+            <a:hlinkClick r:id="" action="ppaction://media"/>
+          </p:cNvPr>
+          <p:cNvPicPr>
+            <a:picLocks noChangeAspect="1"/>
+          </p:cNvPicPr>
+          <p:nvPr>
+            <a:audioFile r:link="rId2"/>
+            <p:extLst>
+              <p:ext uri="{DAA4B4D4-6D71-4841-9C94-3DE7FCFB9230}">
+                <p14:media xmlns:p14="http://schemas.microsoft.com/office/powerpoint/2010/main" r:embed="rId1"/>
+              </p:ext>
+            </p:extLst>
+          </p:nvPr>
+        </p:nvPicPr>
+        <p:blipFill>
+          <a:blip r:embed="rId8"/>
+          <a:stretch>
+            <a:fillRect/>
+          </a:stretch>
+        </p:blipFill>
+        <p:spPr>
+          <a:xfrm>
+            <a:off x="7345287" y="3284984"/>
+            <a:ext cx="609600" cy="609600"/>
+          </a:xfrm>
+          <a:prstGeom prst="rect">
+            <a:avLst/>
+          </a:prstGeom>
+        </p:spPr>
+      </p:pic>
+    </p:spTree>
+    <p:extLst>
+      <p:ext uri="{BB962C8B-B14F-4D97-AF65-F5344CB8AC3E}">
+        <p14:creationId xmlns:p14="http://schemas.microsoft.com/office/powerpoint/2010/main" val="4150519960"/>
+      </p:ext>
+    </p:extLst>
+  </p:cSld>
+  <p:clrMapOvr>
+    <a:masterClrMapping/>
+  </p:clrMapOvr>
+  <p:timing>
+    <p:tnLst>
+      <p:par>
+        <p:cTn id="1" dur="indefinite" restart="never" nodeType="tmRoot">
+          <p:childTnLst>
+            <p:seq concurrent="1" nextAc="seek">
+              <p:cTn id="2" restart="whenNotActive" fill="hold" evtFilter="cancelBubble" nodeType="interactiveSeq">
+                <p:stCondLst>
+                  <p:cond evt="onClick" delay="0">
+                    <p:tgtEl>
+                      <p:spTgt spid="9"/>
+                    </p:tgtEl>
+                  </p:cond>
+                </p:stCondLst>
+                <p:endSync evt="end" delay="0">
+                  <p:rtn val="all"/>
+                </p:endSync>
+                <p:childTnLst>
+                  <p:par>
+                    <p:cTn id="3" fill="hold">
+                      <p:stCondLst>
+                        <p:cond delay="0"/>
+                      </p:stCondLst>
+                      <p:childTnLst>
+                        <p:par>
+                          <p:cTn id="4" fill="hold">
+                            <p:stCondLst>
+                              <p:cond delay="0"/>
+                            </p:stCondLst>
+                            <p:childTnLst>
+                              <p:par>
+                                <p:cTn id="5" presetID="1" presetClass="mediacall" presetSubtype="0" fill="hold" nodeType="clickEffect">
+                                  <p:stCondLst>
+                                    <p:cond delay="0"/>
+                                  </p:stCondLst>
+                                  <p:childTnLst>
+                                    <p:cmd type="call" cmd="playFrom(0.0)">
+                                      <p:cBhvr>
+                                        <p:cTn id="6" dur="5017" fill="hold"/>
+                                        <p:tgtEl>
+                                          <p:spTgt spid="9"/>
+                                        </p:tgtEl>
+                                      </p:cBhvr>
+                                    </p:cmd>
+                                  </p:childTnLst>
+                                </p:cTn>
+                              </p:par>
+                            </p:childTnLst>
+                          </p:cTn>
+                        </p:par>
+                      </p:childTnLst>
+                    </p:cTn>
+                  </p:par>
+                </p:childTnLst>
+              </p:cTn>
+              <p:nextCondLst>
+                <p:cond evt="onClick" delay="0">
+                  <p:tgtEl>
+                    <p:spTgt spid="9"/>
+                  </p:tgtEl>
+                </p:cond>
+              </p:nextCondLst>
+            </p:seq>
+            <p:audio>
+              <p:cMediaNode vol="80000">
+                <p:cTn id="7" fill="hold" display="0">
+                  <p:stCondLst>
+                    <p:cond delay="indefinite"/>
+                  </p:stCondLst>
+                  <p:endCondLst>
+                    <p:cond evt="onStopAudio" delay="0">
+                      <p:tgtEl>
+                        <p:sldTgt/>
+                      </p:tgtEl>
+                    </p:cond>
+                  </p:endCondLst>
+                </p:cTn>
+                <p:tgtEl>
+                  <p:spTgt spid="9"/>
+                </p:tgtEl>
+              </p:cMediaNode>
+            </p:audio>
+            <p:seq concurrent="1" nextAc="seek">
+              <p:cTn id="8" restart="whenNotActive" fill="hold" evtFilter="cancelBubble" nodeType="interactiveSeq">
+                <p:stCondLst>
+                  <p:cond evt="onClick" delay="0">
+                    <p:tgtEl>
+                      <p:spTgt spid="11"/>
+                    </p:tgtEl>
+                  </p:cond>
+                </p:stCondLst>
+                <p:endSync evt="end" delay="0">
+                  <p:rtn val="all"/>
+                </p:endSync>
+                <p:childTnLst>
+                  <p:par>
+                    <p:cTn id="9" fill="hold">
+                      <p:stCondLst>
+                        <p:cond delay="0"/>
+                      </p:stCondLst>
+                      <p:childTnLst>
+                        <p:par>
+                          <p:cTn id="10" fill="hold">
+                            <p:stCondLst>
+                              <p:cond delay="0"/>
+                            </p:stCondLst>
+                            <p:childTnLst>
+                              <p:par>
+                                <p:cTn id="11" presetID="1" presetClass="mediacall" presetSubtype="0" fill="hold" nodeType="clickEffect">
+                                  <p:stCondLst>
+                                    <p:cond delay="0"/>
+                                  </p:stCondLst>
+                                  <p:childTnLst>
+                                    <p:cmd type="call" cmd="playFrom(0.0)">
+                                      <p:cBhvr>
+                                        <p:cTn id="12" dur="5017" fill="hold"/>
+                                        <p:tgtEl>
+                                          <p:spTgt spid="11"/>
+                                        </p:tgtEl>
+                                      </p:cBhvr>
+                                    </p:cmd>
+                                  </p:childTnLst>
+                                </p:cTn>
+                              </p:par>
+                            </p:childTnLst>
+                          </p:cTn>
+                        </p:par>
+                      </p:childTnLst>
+                    </p:cTn>
+                  </p:par>
+                </p:childTnLst>
+              </p:cTn>
+              <p:nextCondLst>
+                <p:cond evt="onClick" delay="0">
+                  <p:tgtEl>
+                    <p:spTgt spid="11"/>
+                  </p:tgtEl>
+                </p:cond>
+              </p:nextCondLst>
+            </p:seq>
+            <p:audio>
+              <p:cMediaNode vol="80000">
+                <p:cTn id="13" fill="hold" display="0">
+                  <p:stCondLst>
+                    <p:cond delay="indefinite"/>
+                  </p:stCondLst>
+                  <p:endCondLst>
+                    <p:cond evt="onStopAudio" delay="0">
+                      <p:tgtEl>
+                        <p:sldTgt/>
+                      </p:tgtEl>
+                    </p:cond>
+                  </p:endCondLst>
+                </p:cTn>
+                <p:tgtEl>
+                  <p:spTgt spid="11"/>
+                </p:tgtEl>
+              </p:cMediaNode>
+            </p:audio>
+            <p:seq concurrent="1" nextAc="seek">
+              <p:cTn id="14" restart="whenNotActive" fill="hold" evtFilter="cancelBubble" nodeType="interactiveSeq">
+                <p:stCondLst>
+                  <p:cond evt="onClick" delay="0">
+                    <p:tgtEl>
+                      <p:spTgt spid="20"/>
+                    </p:tgtEl>
+                  </p:cond>
+                </p:stCondLst>
+                <p:endSync evt="end" delay="0">
+                  <p:rtn val="all"/>
+                </p:endSync>
+                <p:childTnLst>
+                  <p:par>
+                    <p:cTn id="15" fill="hold">
+                      <p:stCondLst>
+                        <p:cond delay="0"/>
+                      </p:stCondLst>
+                      <p:childTnLst>
+                        <p:par>
+                          <p:cTn id="16" fill="hold">
+                            <p:stCondLst>
+                              <p:cond delay="0"/>
+                            </p:stCondLst>
+                            <p:childTnLst>
+                              <p:par>
+                                <p:cTn id="17" presetID="1" presetClass="mediacall" presetSubtype="0" fill="hold" nodeType="clickEffect">
+                                  <p:stCondLst>
+                                    <p:cond delay="0"/>
+                                  </p:stCondLst>
+                                  <p:childTnLst>
+                                    <p:cmd type="call" cmd="playFrom(0.0)">
+                                      <p:cBhvr>
+                                        <p:cTn id="18" dur="5017" fill="hold"/>
+                                        <p:tgtEl>
+                                          <p:spTgt spid="20"/>
+                                        </p:tgtEl>
+                                      </p:cBhvr>
+                                    </p:cmd>
+                                  </p:childTnLst>
+                                </p:cTn>
+                              </p:par>
+                            </p:childTnLst>
+                          </p:cTn>
+                        </p:par>
+                      </p:childTnLst>
+                    </p:cTn>
+                  </p:par>
+                </p:childTnLst>
+              </p:cTn>
+              <p:nextCondLst>
+                <p:cond evt="onClick" delay="0">
+                  <p:tgtEl>
+                    <p:spTgt spid="20"/>
+                  </p:tgtEl>
+                </p:cond>
+              </p:nextCondLst>
+            </p:seq>
+            <p:audio>
+              <p:cMediaNode vol="80000">
+                <p:cTn id="19" fill="hold" display="0">
+                  <p:stCondLst>
+                    <p:cond delay="indefinite"/>
+                  </p:stCondLst>
+                  <p:endCondLst>
+                    <p:cond evt="onStopAudio" delay="0">
+                      <p:tgtEl>
+                        <p:sldTgt/>
+                      </p:tgtEl>
+                    </p:cond>
+                  </p:endCondLst>
+                </p:cTn>
+                <p:tgtEl>
+                  <p:spTgt spid="20"/>
+                </p:tgtEl>
+              </p:cMediaNode>
+            </p:audio>
+            <p:seq concurrent="1" nextAc="seek">
+              <p:cTn id="20" restart="whenNotActive" fill="hold" evtFilter="cancelBubble" nodeType="interactiveSeq">
+                <p:stCondLst>
+                  <p:cond evt="onClick" delay="0">
+                    <p:tgtEl>
+                      <p:spTgt spid="27"/>
+                    </p:tgtEl>
+                  </p:cond>
+                </p:stCondLst>
+                <p:endSync evt="end" delay="0">
+                  <p:rtn val="all"/>
+                </p:endSync>
+                <p:childTnLst>
+                  <p:par>
+                    <p:cTn id="21" fill="hold">
+                      <p:stCondLst>
+                        <p:cond delay="0"/>
+                      </p:stCondLst>
+                      <p:childTnLst>
+                        <p:par>
+                          <p:cTn id="22" fill="hold">
+                            <p:stCondLst>
+                              <p:cond delay="0"/>
+                            </p:stCondLst>
+                            <p:childTnLst>
+                              <p:par>
+                                <p:cTn id="23" presetID="1" presetClass="mediacall" presetSubtype="0" fill="hold" nodeType="clickEffect">
+                                  <p:stCondLst>
+                                    <p:cond delay="0"/>
+                                  </p:stCondLst>
+                                  <p:childTnLst>
+                                    <p:cmd type="call" cmd="playFrom(0.0)">
+                                      <p:cBhvr>
+                                        <p:cTn id="24" dur="5017" fill="hold"/>
+                                        <p:tgtEl>
+                                          <p:spTgt spid="27"/>
+                                        </p:tgtEl>
+                                      </p:cBhvr>
+                                    </p:cmd>
+                                  </p:childTnLst>
+                                </p:cTn>
+                              </p:par>
+                            </p:childTnLst>
+                          </p:cTn>
+                        </p:par>
+                      </p:childTnLst>
+                    </p:cTn>
+                  </p:par>
+                </p:childTnLst>
+              </p:cTn>
+              <p:nextCondLst>
+                <p:cond evt="onClick" delay="0">
+                  <p:tgtEl>
+                    <p:spTgt spid="27"/>
+                  </p:tgtEl>
+                </p:cond>
+              </p:nextCondLst>
+            </p:seq>
+            <p:audio>
+              <p:cMediaNode vol="80000">
+                <p:cTn id="25" fill="hold" display="0">
+                  <p:stCondLst>
+                    <p:cond delay="indefinite"/>
+                  </p:stCondLst>
+                  <p:endCondLst>
+                    <p:cond evt="onStopAudio" delay="0">
+                      <p:tgtEl>
+                        <p:sldTgt/>
+                      </p:tgtEl>
+                    </p:cond>
+                  </p:endCondLst>
+                </p:cTn>
+                <p:tgtEl>
+                  <p:spTgt spid="27"/>
+                </p:tgtEl>
+              </p:cMediaNode>
+            </p:audio>
+          </p:childTnLst>
+        </p:cTn>
+      </p:par>
+    </p:tnLst>
+  </p:timing>
+</p:sld>
+</file>
+
+<file path=ppt/slides/slide15.xml><?xml version="1.0" encoding="utf-8"?>
+<p:sld xmlns:a="http://schemas.openxmlformats.org/drawingml/2006/main" xmlns:r="http://schemas.openxmlformats.org/officeDocument/2006/relationships" xmlns:p="http://schemas.openxmlformats.org/presentationml/2006/main">
+  <p:cSld>
+    <p:spTree>
+      <p:nvGrpSpPr>
+        <p:cNvPr id="1" name=""/>
+        <p:cNvGrpSpPr/>
+        <p:nvPr/>
+      </p:nvGrpSpPr>
+      <p:grpSpPr>
+        <a:xfrm>
+          <a:off x="0" y="0"/>
+          <a:ext cx="0" cy="0"/>
+          <a:chOff x="0" y="0"/>
+          <a:chExt cx="0" cy="0"/>
+        </a:xfrm>
+      </p:grpSpPr>
+      <p:sp>
+        <p:nvSpPr>
+          <p:cNvPr id="3" name="2 CuadroTexto"/>
+          <p:cNvSpPr txBox="1"/>
+          <p:nvPr/>
+        </p:nvSpPr>
+        <p:spPr>
+          <a:xfrm>
+            <a:off x="0" y="-1"/>
+            <a:ext cx="2987825" cy="307777"/>
+          </a:xfrm>
+          <a:prstGeom prst="rect">
+            <a:avLst/>
+          </a:prstGeom>
+          <a:noFill/>
+        </p:spPr>
+        <p:txBody>
+          <a:bodyPr wrap="square" rtlCol="0">
+            <a:spAutoFit/>
+          </a:bodyPr>
+          <a:lstStyle/>
+          <a:p>
+            <a:r>
+              <a:rPr lang="es-ES" sz="1400" dirty="0" smtClean="0">
+                <a:solidFill>
+                  <a:schemeClr val="bg1">
+                    <a:lumMod val="50000"/>
+                  </a:schemeClr>
+                </a:solidFill>
+              </a:rPr>
+              <a:t>resultados</a:t>
+            </a:r>
+            <a:endParaRPr lang="es-ES" sz="1400" dirty="0">
+              <a:solidFill>
+                <a:schemeClr val="bg1">
+                  <a:lumMod val="50000"/>
+                </a:schemeClr>
+              </a:solidFill>
+            </a:endParaRPr>
+          </a:p>
+        </p:txBody>
+      </p:sp>
+      <p:sp>
+        <p:nvSpPr>
+          <p:cNvPr id="6" name="5 CuadroTexto"/>
+          <p:cNvSpPr txBox="1"/>
+          <p:nvPr/>
+        </p:nvSpPr>
+        <p:spPr>
+          <a:xfrm>
+            <a:off x="6156175" y="0"/>
+            <a:ext cx="2987825" cy="307777"/>
+          </a:xfrm>
+          <a:prstGeom prst="rect">
+            <a:avLst/>
+          </a:prstGeom>
+          <a:noFill/>
+        </p:spPr>
+        <p:txBody>
+          <a:bodyPr wrap="square" rtlCol="0">
+            <a:spAutoFit/>
+          </a:bodyPr>
+          <a:lstStyle/>
+          <a:p>
+            <a:pPr algn="r"/>
+            <a:r>
+              <a:rPr lang="es-ES" sz="1400" dirty="0" smtClean="0">
+                <a:solidFill>
+                  <a:schemeClr val="bg1">
+                    <a:lumMod val="50000"/>
+                  </a:schemeClr>
+                </a:solidFill>
+              </a:rPr>
+              <a:t>Defensa de tesis – Diciembre 2016</a:t>
+            </a:r>
+            <a:endParaRPr lang="es-ES" sz="1400" dirty="0">
+              <a:solidFill>
+                <a:schemeClr val="bg1">
+                  <a:lumMod val="50000"/>
+                </a:schemeClr>
+              </a:solidFill>
+            </a:endParaRPr>
+          </a:p>
+        </p:txBody>
+      </p:sp>
+      <p:sp>
+        <p:nvSpPr>
+          <p:cNvPr id="8" name="7 CuadroTexto"/>
+          <p:cNvSpPr txBox="1"/>
+          <p:nvPr/>
+        </p:nvSpPr>
+        <p:spPr>
+          <a:xfrm>
+            <a:off x="-19988" y="548680"/>
+            <a:ext cx="9143999" cy="584775"/>
+          </a:xfrm>
+          <a:prstGeom prst="rect">
+            <a:avLst/>
+          </a:prstGeom>
+          <a:noFill/>
+        </p:spPr>
+        <p:txBody>
+          <a:bodyPr wrap="square" rtlCol="0">
+            <a:spAutoFit/>
+          </a:bodyPr>
+          <a:lstStyle/>
+          <a:p>
+            <a:pPr algn="ctr"/>
+            <a:r>
+              <a:rPr lang="es-ES" sz="3200" dirty="0" smtClean="0">
+                <a:latin typeface="+mj-lt"/>
+              </a:rPr>
+              <a:t>Segundo experimento…</a:t>
+            </a:r>
+          </a:p>
+        </p:txBody>
+      </p:sp>
+      <p:pic>
+        <p:nvPicPr>
+          <p:cNvPr id="5" name="4 Imagen"/>
+          <p:cNvPicPr>
+            <a:picLocks noChangeAspect="1"/>
+          </p:cNvPicPr>
+          <p:nvPr/>
+        </p:nvPicPr>
+        <p:blipFill>
+          <a:blip r:embed="rId3">
+            <a:extLst>
+              <a:ext uri="{28A0092B-C50C-407E-A947-70E740481C1C}">
+                <a14:useLocalDpi xmlns:a14="http://schemas.microsoft.com/office/drawing/2010/main" val="0"/>
+              </a:ext>
+            </a:extLst>
+          </a:blip>
+          <a:stretch>
+            <a:fillRect/>
+          </a:stretch>
+        </p:blipFill>
+        <p:spPr>
+          <a:xfrm>
+            <a:off x="867055" y="3155953"/>
+            <a:ext cx="885825" cy="866775"/>
+          </a:xfrm>
+          <a:prstGeom prst="rect">
+            <a:avLst/>
+          </a:prstGeom>
+        </p:spPr>
+      </p:pic>
+      <p:pic>
+        <p:nvPicPr>
+          <p:cNvPr id="7" name="6 Imagen"/>
+          <p:cNvPicPr>
+            <a:picLocks noChangeAspect="1"/>
+          </p:cNvPicPr>
+          <p:nvPr/>
+        </p:nvPicPr>
+        <p:blipFill>
+          <a:blip r:embed="rId4">
+            <a:extLst>
+              <a:ext uri="{28A0092B-C50C-407E-A947-70E740481C1C}">
+                <a14:useLocalDpi xmlns:a14="http://schemas.microsoft.com/office/drawing/2010/main" val="0"/>
+              </a:ext>
+            </a:extLst>
+          </a:blip>
+          <a:stretch>
+            <a:fillRect/>
+          </a:stretch>
+        </p:blipFill>
+        <p:spPr>
+          <a:xfrm>
+            <a:off x="372406" y="4148000"/>
+            <a:ext cx="895350" cy="885825"/>
+          </a:xfrm>
+          <a:prstGeom prst="rect">
+            <a:avLst/>
+          </a:prstGeom>
+        </p:spPr>
+      </p:pic>
+      <p:pic>
+        <p:nvPicPr>
+          <p:cNvPr id="10" name="9 Imagen"/>
+          <p:cNvPicPr>
+            <a:picLocks noChangeAspect="1"/>
+          </p:cNvPicPr>
+          <p:nvPr/>
+        </p:nvPicPr>
+        <p:blipFill>
+          <a:blip r:embed="rId5">
+            <a:extLst>
+              <a:ext uri="{28A0092B-C50C-407E-A947-70E740481C1C}">
+                <a14:useLocalDpi xmlns:a14="http://schemas.microsoft.com/office/drawing/2010/main" val="0"/>
+              </a:ext>
+            </a:extLst>
+          </a:blip>
+          <a:stretch>
+            <a:fillRect/>
+          </a:stretch>
+        </p:blipFill>
+        <p:spPr>
+          <a:xfrm>
+            <a:off x="1590487" y="4147999"/>
+            <a:ext cx="904875" cy="885825"/>
+          </a:xfrm>
+          <a:prstGeom prst="rect">
+            <a:avLst/>
+          </a:prstGeom>
+        </p:spPr>
+      </p:pic>
+      <p:pic>
+        <p:nvPicPr>
+          <p:cNvPr id="12" name="11 Imagen"/>
+          <p:cNvPicPr>
+            <a:picLocks noChangeAspect="1"/>
+          </p:cNvPicPr>
+          <p:nvPr/>
+        </p:nvPicPr>
+        <p:blipFill>
+          <a:blip r:embed="rId6">
+            <a:extLst>
+              <a:ext uri="{28A0092B-C50C-407E-A947-70E740481C1C}">
+                <a14:useLocalDpi xmlns:a14="http://schemas.microsoft.com/office/drawing/2010/main" val="0"/>
+              </a:ext>
+            </a:extLst>
+          </a:blip>
+          <a:stretch>
+            <a:fillRect/>
+          </a:stretch>
+        </p:blipFill>
+        <p:spPr>
+          <a:xfrm>
+            <a:off x="1549587" y="4916929"/>
+            <a:ext cx="923925" cy="904875"/>
+          </a:xfrm>
+          <a:prstGeom prst="rect">
+            <a:avLst/>
+          </a:prstGeom>
+        </p:spPr>
+      </p:pic>
+      <p:pic>
+        <p:nvPicPr>
+          <p:cNvPr id="13" name="12 Imagen"/>
+          <p:cNvPicPr>
+            <a:picLocks noChangeAspect="1"/>
+          </p:cNvPicPr>
+          <p:nvPr/>
+        </p:nvPicPr>
+        <p:blipFill>
+          <a:blip r:embed="rId7">
+            <a:extLst>
+              <a:ext uri="{28A0092B-C50C-407E-A947-70E740481C1C}">
+                <a14:useLocalDpi xmlns:a14="http://schemas.microsoft.com/office/drawing/2010/main" val="0"/>
+              </a:ext>
+            </a:extLst>
+          </a:blip>
+          <a:stretch>
+            <a:fillRect/>
+          </a:stretch>
+        </p:blipFill>
+        <p:spPr>
+          <a:xfrm>
+            <a:off x="372406" y="4926454"/>
+            <a:ext cx="923925" cy="895350"/>
+          </a:xfrm>
+          <a:prstGeom prst="rect">
+            <a:avLst/>
+          </a:prstGeom>
+        </p:spPr>
+      </p:pic>
+      <p:pic>
+        <p:nvPicPr>
+          <p:cNvPr id="14" name="13 Imagen"/>
+          <p:cNvPicPr>
+            <a:picLocks noChangeAspect="1"/>
+          </p:cNvPicPr>
+          <p:nvPr/>
+        </p:nvPicPr>
+        <p:blipFill>
+          <a:blip r:embed="rId8">
+            <a:extLst>
+              <a:ext uri="{28A0092B-C50C-407E-A947-70E740481C1C}">
+                <a14:useLocalDpi xmlns:a14="http://schemas.microsoft.com/office/drawing/2010/main" val="0"/>
+              </a:ext>
+            </a:extLst>
+          </a:blip>
+          <a:stretch>
+            <a:fillRect/>
+          </a:stretch>
+        </p:blipFill>
+        <p:spPr>
+          <a:xfrm>
+            <a:off x="1571437" y="5800678"/>
+            <a:ext cx="904875" cy="885825"/>
+          </a:xfrm>
+          <a:prstGeom prst="rect">
+            <a:avLst/>
+          </a:prstGeom>
+        </p:spPr>
+      </p:pic>
+      <p:pic>
+        <p:nvPicPr>
+          <p:cNvPr id="15" name="14 Imagen"/>
+          <p:cNvPicPr>
+            <a:picLocks noChangeAspect="1"/>
+          </p:cNvPicPr>
+          <p:nvPr/>
+        </p:nvPicPr>
+        <p:blipFill>
+          <a:blip r:embed="rId9">
+            <a:extLst>
+              <a:ext uri="{28A0092B-C50C-407E-A947-70E740481C1C}">
+                <a14:useLocalDpi xmlns:a14="http://schemas.microsoft.com/office/drawing/2010/main" val="0"/>
+              </a:ext>
+            </a:extLst>
+          </a:blip>
+          <a:stretch>
+            <a:fillRect/>
+          </a:stretch>
+        </p:blipFill>
+        <p:spPr>
+          <a:xfrm>
+            <a:off x="349117" y="5820761"/>
+            <a:ext cx="933450" cy="923925"/>
+          </a:xfrm>
+          <a:prstGeom prst="rect">
+            <a:avLst/>
+          </a:prstGeom>
+        </p:spPr>
+      </p:pic>
+      <p:sp>
+        <p:nvSpPr>
+          <p:cNvPr id="29" name="28 CuadroTexto"/>
+          <p:cNvSpPr txBox="1"/>
+          <p:nvPr/>
+        </p:nvSpPr>
+        <p:spPr>
+          <a:xfrm>
+            <a:off x="606773" y="2903272"/>
+            <a:ext cx="1351588" cy="307777"/>
+          </a:xfrm>
+          <a:prstGeom prst="rect">
+            <a:avLst/>
+          </a:prstGeom>
+          <a:noFill/>
+        </p:spPr>
+        <p:txBody>
+          <a:bodyPr wrap="none" rtlCol="0">
+            <a:spAutoFit/>
+          </a:bodyPr>
+          <a:lstStyle/>
+          <a:p>
+            <a:r>
+              <a:rPr lang="es-ES" sz="1400" dirty="0" smtClean="0"/>
+              <a:t>Estimulo neutro</a:t>
+            </a:r>
+            <a:endParaRPr lang="es-ES" sz="1400" dirty="0"/>
+          </a:p>
+        </p:txBody>
+      </p:sp>
+      <p:sp>
+        <p:nvSpPr>
+          <p:cNvPr id="30" name="29 CuadroTexto"/>
+          <p:cNvSpPr txBox="1"/>
+          <p:nvPr/>
+        </p:nvSpPr>
+        <p:spPr>
+          <a:xfrm>
+            <a:off x="489187" y="3719123"/>
+            <a:ext cx="1614288" cy="307777"/>
+          </a:xfrm>
+          <a:prstGeom prst="rect">
+            <a:avLst/>
+          </a:prstGeom>
+          <a:noFill/>
+        </p:spPr>
+        <p:txBody>
+          <a:bodyPr wrap="none" rtlCol="0">
+            <a:spAutoFit/>
+          </a:bodyPr>
+          <a:lstStyle/>
+          <a:p>
+            <a:r>
+              <a:rPr lang="es-ES" sz="1400" dirty="0" err="1" smtClean="0"/>
+              <a:t>Estimulos</a:t>
+            </a:r>
+            <a:r>
+              <a:rPr lang="es-ES" sz="1400" dirty="0" smtClean="0"/>
+              <a:t> con señal</a:t>
+            </a:r>
+            <a:endParaRPr lang="es-ES" sz="1400" dirty="0"/>
+          </a:p>
+        </p:txBody>
+      </p:sp>
+      <p:cxnSp>
+        <p:nvCxnSpPr>
+          <p:cNvPr id="31" name="30 Conector recto de flecha"/>
+          <p:cNvCxnSpPr/>
+          <p:nvPr/>
+        </p:nvCxnSpPr>
+        <p:spPr>
+          <a:xfrm>
+            <a:off x="1308510" y="4153438"/>
+            <a:ext cx="18343" cy="2299898"/>
+          </a:xfrm>
+          <a:prstGeom prst="straightConnector1">
+            <a:avLst/>
+          </a:prstGeom>
+          <a:ln w="57150">
+            <a:tailEnd type="arrow"/>
+          </a:ln>
+        </p:spPr>
+        <p:style>
+          <a:lnRef idx="1">
+            <a:schemeClr val="accent1"/>
+          </a:lnRef>
+          <a:fillRef idx="0">
+            <a:schemeClr val="accent1"/>
+          </a:fillRef>
+          <a:effectRef idx="0">
+            <a:schemeClr val="accent1"/>
+          </a:effectRef>
+          <a:fontRef idx="minor">
+            <a:schemeClr val="tx1"/>
+          </a:fontRef>
+        </p:style>
+      </p:cxnSp>
+      <p:sp>
+        <p:nvSpPr>
+          <p:cNvPr id="32" name="31 CuadroTexto"/>
+          <p:cNvSpPr txBox="1"/>
+          <p:nvPr/>
+        </p:nvSpPr>
+        <p:spPr>
+          <a:xfrm>
+            <a:off x="926743" y="4653136"/>
+            <a:ext cx="400110" cy="989373"/>
+          </a:xfrm>
+          <a:prstGeom prst="rect">
+            <a:avLst/>
+          </a:prstGeom>
+          <a:noFill/>
+        </p:spPr>
+        <p:txBody>
+          <a:bodyPr vert="vert270" wrap="none" rtlCol="0">
+            <a:spAutoFit/>
+          </a:bodyPr>
+          <a:lstStyle/>
+          <a:p>
+            <a:r>
+              <a:rPr lang="es-ES" sz="1400" dirty="0" smtClean="0"/>
+              <a:t>Mayor señal</a:t>
+            </a:r>
+            <a:endParaRPr lang="es-ES" sz="1400" dirty="0"/>
+          </a:p>
+        </p:txBody>
+      </p:sp>
+      <p:sp>
+        <p:nvSpPr>
+          <p:cNvPr id="33" name="32 CuadroTexto"/>
+          <p:cNvSpPr txBox="1"/>
+          <p:nvPr/>
+        </p:nvSpPr>
+        <p:spPr>
+          <a:xfrm>
+            <a:off x="1286783" y="4509120"/>
+            <a:ext cx="400110" cy="1311641"/>
+          </a:xfrm>
+          <a:prstGeom prst="rect">
+            <a:avLst/>
+          </a:prstGeom>
+          <a:noFill/>
+        </p:spPr>
+        <p:txBody>
+          <a:bodyPr vert="vert270" wrap="none" rtlCol="0">
+            <a:spAutoFit/>
+          </a:bodyPr>
+          <a:lstStyle/>
+          <a:p>
+            <a:r>
+              <a:rPr lang="es-ES" sz="1400" dirty="0" smtClean="0"/>
+              <a:t>Menor dificultad</a:t>
+            </a:r>
+            <a:endParaRPr lang="es-ES" sz="1400" dirty="0"/>
+          </a:p>
+        </p:txBody>
+      </p:sp>
+      <p:sp>
+        <p:nvSpPr>
+          <p:cNvPr id="34" name="33 CuadroTexto"/>
+          <p:cNvSpPr txBox="1"/>
+          <p:nvPr/>
+        </p:nvSpPr>
+        <p:spPr>
+          <a:xfrm>
+            <a:off x="0" y="2204864"/>
+            <a:ext cx="2653088" cy="553998"/>
+          </a:xfrm>
+          <a:prstGeom prst="rect">
+            <a:avLst/>
+          </a:prstGeom>
+          <a:noFill/>
+        </p:spPr>
+        <p:txBody>
+          <a:bodyPr wrap="square" rtlCol="0">
+            <a:spAutoFit/>
+          </a:bodyPr>
+          <a:lstStyle/>
+          <a:p>
+            <a:pPr algn="ctr"/>
+            <a:r>
+              <a:rPr lang="es-ES" sz="1600" dirty="0" smtClean="0"/>
+              <a:t>Tipos de estímulos utilizados</a:t>
+            </a:r>
+          </a:p>
+          <a:p>
+            <a:pPr algn="ctr"/>
+            <a:r>
+              <a:rPr lang="es-ES" sz="1400" dirty="0" smtClean="0"/>
+              <a:t>8ejemplos para angulos9</a:t>
+            </a:r>
+            <a:endParaRPr lang="es-ES" sz="1400" dirty="0"/>
+          </a:p>
+        </p:txBody>
+      </p:sp>
+      <p:sp>
+        <p:nvSpPr>
+          <p:cNvPr id="35" name="34 CuadroTexto"/>
+          <p:cNvSpPr txBox="1"/>
+          <p:nvPr/>
+        </p:nvSpPr>
+        <p:spPr>
+          <a:xfrm>
+            <a:off x="1452526" y="3226622"/>
+            <a:ext cx="1175258" cy="276999"/>
+          </a:xfrm>
+          <a:prstGeom prst="rect">
+            <a:avLst/>
+          </a:prstGeom>
+          <a:noFill/>
+        </p:spPr>
+        <p:txBody>
+          <a:bodyPr wrap="none" rtlCol="0">
+            <a:spAutoFit/>
+          </a:bodyPr>
+          <a:lstStyle/>
+          <a:p>
+            <a:r>
+              <a:rPr lang="es-ES" sz="1200" dirty="0" err="1" smtClean="0"/>
+              <a:t>Orientacion</a:t>
+            </a:r>
+            <a:r>
+              <a:rPr lang="es-ES" sz="1200" dirty="0" smtClean="0"/>
+              <a:t> 90º</a:t>
+            </a:r>
+            <a:endParaRPr lang="es-ES" sz="1200" dirty="0"/>
+          </a:p>
+        </p:txBody>
+      </p:sp>
+      <p:pic>
+        <p:nvPicPr>
+          <p:cNvPr id="16" name="15 Imagen"/>
+          <p:cNvPicPr>
+            <a:picLocks noChangeAspect="1"/>
+          </p:cNvPicPr>
+          <p:nvPr/>
+        </p:nvPicPr>
+        <p:blipFill>
+          <a:blip r:embed="rId10">
+            <a:extLst>
+              <a:ext uri="{28A0092B-C50C-407E-A947-70E740481C1C}">
+                <a14:useLocalDpi xmlns:a14="http://schemas.microsoft.com/office/drawing/2010/main" val="0"/>
+              </a:ext>
+            </a:extLst>
+          </a:blip>
+          <a:stretch>
+            <a:fillRect/>
+          </a:stretch>
+        </p:blipFill>
+        <p:spPr>
+          <a:xfrm>
+            <a:off x="2750096" y="3901503"/>
+            <a:ext cx="6286400" cy="2935728"/>
+          </a:xfrm>
+          <a:prstGeom prst="rect">
+            <a:avLst/>
+          </a:prstGeom>
+        </p:spPr>
+      </p:pic>
+      <p:sp>
+        <p:nvSpPr>
+          <p:cNvPr id="17" name="16 CuadroTexto"/>
+          <p:cNvSpPr txBox="1"/>
+          <p:nvPr/>
+        </p:nvSpPr>
+        <p:spPr>
+          <a:xfrm>
+            <a:off x="3406897" y="1429371"/>
+            <a:ext cx="5616624" cy="1323439"/>
+          </a:xfrm>
+          <a:prstGeom prst="rect">
+            <a:avLst/>
+          </a:prstGeom>
+          <a:noFill/>
+        </p:spPr>
+        <p:txBody>
+          <a:bodyPr wrap="square" rtlCol="0">
+            <a:spAutoFit/>
+          </a:bodyPr>
+          <a:lstStyle/>
+          <a:p>
+            <a:pPr marL="285750" indent="-285750">
+              <a:buFontTx/>
+              <a:buChar char="-"/>
+            </a:pPr>
+            <a:r>
+              <a:rPr lang="es-ES" sz="2000" dirty="0" smtClean="0"/>
+              <a:t>Se agrego la </a:t>
+            </a:r>
+            <a:r>
+              <a:rPr lang="es-ES" sz="2000" dirty="0" err="1" smtClean="0"/>
+              <a:t>medicion</a:t>
+            </a:r>
+            <a:r>
+              <a:rPr lang="es-ES" sz="2000" dirty="0" smtClean="0"/>
+              <a:t> de la </a:t>
+            </a:r>
+            <a:r>
+              <a:rPr lang="es-ES" sz="2000" dirty="0" err="1" smtClean="0"/>
+              <a:t>categoria</a:t>
+            </a:r>
+            <a:r>
+              <a:rPr lang="es-ES" sz="2000" dirty="0" smtClean="0"/>
+              <a:t> </a:t>
+            </a:r>
+            <a:r>
+              <a:rPr lang="es-ES" sz="2000" dirty="0" err="1" smtClean="0"/>
+              <a:t>angulos</a:t>
+            </a:r>
+            <a:endParaRPr lang="es-ES" sz="2000" dirty="0" smtClean="0"/>
+          </a:p>
+          <a:p>
+            <a:pPr marL="285750" indent="-285750">
+              <a:buFontTx/>
+              <a:buChar char="-"/>
+            </a:pPr>
+            <a:r>
+              <a:rPr lang="es-ES" sz="2000" dirty="0" smtClean="0"/>
+              <a:t>Se </a:t>
+            </a:r>
+            <a:r>
+              <a:rPr lang="es-ES" sz="2000" dirty="0" err="1" smtClean="0"/>
+              <a:t>seleccióno</a:t>
+            </a:r>
+            <a:r>
+              <a:rPr lang="es-ES" sz="2000" dirty="0" smtClean="0"/>
+              <a:t> unas pocas orientaciones</a:t>
+            </a:r>
+          </a:p>
+          <a:p>
+            <a:pPr marL="285750" indent="-285750">
+              <a:buFontTx/>
+              <a:buChar char="-"/>
+            </a:pPr>
+            <a:r>
+              <a:rPr lang="es-ES" sz="2000" dirty="0" smtClean="0"/>
+              <a:t>Se hizo el experimento con 12 sujetos en </a:t>
+            </a:r>
+            <a:r>
+              <a:rPr lang="es-ES" sz="2000" dirty="0" err="1" smtClean="0"/>
+              <a:t>condicion</a:t>
+            </a:r>
+            <a:r>
+              <a:rPr lang="es-ES" sz="2000" dirty="0" smtClean="0"/>
+              <a:t> de laboratorio</a:t>
+            </a:r>
+          </a:p>
+        </p:txBody>
+      </p:sp>
+      <p:sp>
+        <p:nvSpPr>
+          <p:cNvPr id="36" name="35 CuadroTexto"/>
+          <p:cNvSpPr txBox="1"/>
+          <p:nvPr/>
+        </p:nvSpPr>
+        <p:spPr>
+          <a:xfrm>
+            <a:off x="3023828" y="3487294"/>
+            <a:ext cx="5940660" cy="400110"/>
+          </a:xfrm>
+          <a:prstGeom prst="rect">
+            <a:avLst/>
+          </a:prstGeom>
+          <a:noFill/>
+        </p:spPr>
+        <p:txBody>
+          <a:bodyPr wrap="square" rtlCol="0">
+            <a:spAutoFit/>
+          </a:bodyPr>
+          <a:lstStyle/>
+          <a:p>
+            <a:pPr algn="ctr"/>
+            <a:r>
+              <a:rPr lang="es-ES" sz="2000" dirty="0" smtClean="0"/>
+              <a:t>Resultados obtenidos</a:t>
+            </a:r>
+          </a:p>
+        </p:txBody>
+      </p:sp>
+    </p:spTree>
+    <p:extLst>
+      <p:ext uri="{BB962C8B-B14F-4D97-AF65-F5344CB8AC3E}">
+        <p14:creationId xmlns:p14="http://schemas.microsoft.com/office/powerpoint/2010/main" val="1595253707"/>
       </p:ext>
     </p:extLst>
   </p:cSld>

</xml_diff>